<commit_message>
class & lambda slides
</commit_message>
<xml_diff>
--- a/ipsa/slides/classes.pptx
+++ b/ipsa/slides/classes.pptx
@@ -156,7 +156,7 @@
   <pc:docChgLst>
     <pc:chgData name="Gerth Stølting" userId="04ef4784-6591-4f86-a140-f5c3b108582a" providerId="ADAL" clId="{A91DA5EE-9FE5-4323-8FC4-B1817E7AE0A9}"/>
     <pc:docChg chg="undo custSel modSld">
-      <pc:chgData name="Gerth Stølting" userId="04ef4784-6591-4f86-a140-f5c3b108582a" providerId="ADAL" clId="{A91DA5EE-9FE5-4323-8FC4-B1817E7AE0A9}" dt="2023-03-05T17:18:40.515" v="109" actId="20577"/>
+      <pc:chgData name="Gerth Stølting" userId="04ef4784-6591-4f86-a140-f5c3b108582a" providerId="ADAL" clId="{A91DA5EE-9FE5-4323-8FC4-B1817E7AE0A9}" dt="2023-03-06T11:20:13.285" v="115" actId="20577"/>
       <pc:docMkLst>
         <pc:docMk/>
       </pc:docMkLst>
@@ -172,6 +172,21 @@
             <pc:docMk/>
             <pc:sldMk cId="2384964314" sldId="616"/>
             <ac:spMk id="3" creationId="{00000000-0000-0000-0000-000000000000}"/>
+          </ac:spMkLst>
+        </pc:spChg>
+      </pc:sldChg>
+      <pc:sldChg chg="modSp mod">
+        <pc:chgData name="Gerth Stølting" userId="04ef4784-6591-4f86-a140-f5c3b108582a" providerId="ADAL" clId="{A91DA5EE-9FE5-4323-8FC4-B1817E7AE0A9}" dt="2023-03-06T11:20:13.285" v="115" actId="20577"/>
+        <pc:sldMkLst>
+          <pc:docMk/>
+          <pc:sldMk cId="3634352186" sldId="619"/>
+        </pc:sldMkLst>
+        <pc:spChg chg="mod">
+          <ac:chgData name="Gerth Stølting" userId="04ef4784-6591-4f86-a140-f5c3b108582a" providerId="ADAL" clId="{A91DA5EE-9FE5-4323-8FC4-B1817E7AE0A9}" dt="2023-03-06T11:20:13.285" v="115" actId="20577"/>
+          <ac:spMkLst>
+            <pc:docMk/>
+            <pc:sldMk cId="3634352186" sldId="619"/>
+            <ac:spMk id="2" creationId="{00000000-0000-0000-0000-000000000000}"/>
           </ac:spMkLst>
         </pc:spChg>
       </pc:sldChg>
@@ -586,7 +601,7 @@
           <a:p>
             <a:fld id="{FB1A172F-81D4-4DC4-9113-1DBD56EC3646}" type="datetimeFigureOut">
               <a:rPr lang="en-US" smtClean="0"/>
-              <a:t>3/5/2023</a:t>
+              <a:t>3/6/2023</a:t>
             </a:fld>
             <a:endParaRPr lang="en-US"/>
           </a:p>
@@ -2349,7 +2364,7 @@
           <a:p>
             <a:fld id="{0560A9CD-0304-4E0B-9E82-E7E0115DE05B}" type="datetimeFigureOut">
               <a:rPr lang="en-US" smtClean="0"/>
-              <a:t>3/5/2023</a:t>
+              <a:t>3/6/2023</a:t>
             </a:fld>
             <a:endParaRPr lang="en-US"/>
           </a:p>
@@ -2517,7 +2532,7 @@
           <a:p>
             <a:fld id="{0560A9CD-0304-4E0B-9E82-E7E0115DE05B}" type="datetimeFigureOut">
               <a:rPr lang="en-US" smtClean="0"/>
-              <a:t>3/5/2023</a:t>
+              <a:t>3/6/2023</a:t>
             </a:fld>
             <a:endParaRPr lang="en-US"/>
           </a:p>
@@ -2695,7 +2710,7 @@
           <a:p>
             <a:fld id="{0560A9CD-0304-4E0B-9E82-E7E0115DE05B}" type="datetimeFigureOut">
               <a:rPr lang="en-US" smtClean="0"/>
-              <a:t>3/5/2023</a:t>
+              <a:t>3/6/2023</a:t>
             </a:fld>
             <a:endParaRPr lang="en-US"/>
           </a:p>
@@ -2878,7 +2893,7 @@
           <a:p>
             <a:fld id="{0560A9CD-0304-4E0B-9E82-E7E0115DE05B}" type="datetimeFigureOut">
               <a:rPr lang="en-US" smtClean="0"/>
-              <a:t>3/5/2023</a:t>
+              <a:t>3/6/2023</a:t>
             </a:fld>
             <a:endParaRPr lang="en-US"/>
           </a:p>
@@ -3123,7 +3138,7 @@
           <a:p>
             <a:fld id="{0560A9CD-0304-4E0B-9E82-E7E0115DE05B}" type="datetimeFigureOut">
               <a:rPr lang="en-US" smtClean="0"/>
-              <a:t>3/5/2023</a:t>
+              <a:t>3/6/2023</a:t>
             </a:fld>
             <a:endParaRPr lang="en-US"/>
           </a:p>
@@ -3352,7 +3367,7 @@
           <a:p>
             <a:fld id="{0560A9CD-0304-4E0B-9E82-E7E0115DE05B}" type="datetimeFigureOut">
               <a:rPr lang="en-US" smtClean="0"/>
-              <a:t>3/5/2023</a:t>
+              <a:t>3/6/2023</a:t>
             </a:fld>
             <a:endParaRPr lang="en-US"/>
           </a:p>
@@ -3716,7 +3731,7 @@
           <a:p>
             <a:fld id="{0560A9CD-0304-4E0B-9E82-E7E0115DE05B}" type="datetimeFigureOut">
               <a:rPr lang="en-US" smtClean="0"/>
-              <a:t>3/5/2023</a:t>
+              <a:t>3/6/2023</a:t>
             </a:fld>
             <a:endParaRPr lang="en-US"/>
           </a:p>
@@ -3833,7 +3848,7 @@
           <a:p>
             <a:fld id="{0560A9CD-0304-4E0B-9E82-E7E0115DE05B}" type="datetimeFigureOut">
               <a:rPr lang="en-US" smtClean="0"/>
-              <a:t>3/5/2023</a:t>
+              <a:t>3/6/2023</a:t>
             </a:fld>
             <a:endParaRPr lang="en-US"/>
           </a:p>
@@ -3928,7 +3943,7 @@
           <a:p>
             <a:fld id="{0560A9CD-0304-4E0B-9E82-E7E0115DE05B}" type="datetimeFigureOut">
               <a:rPr lang="en-US" smtClean="0"/>
-              <a:t>3/5/2023</a:t>
+              <a:t>3/6/2023</a:t>
             </a:fld>
             <a:endParaRPr lang="en-US"/>
           </a:p>
@@ -4203,7 +4218,7 @@
           <a:p>
             <a:fld id="{0560A9CD-0304-4E0B-9E82-E7E0115DE05B}" type="datetimeFigureOut">
               <a:rPr lang="en-US" smtClean="0"/>
-              <a:t>3/5/2023</a:t>
+              <a:t>3/6/2023</a:t>
             </a:fld>
             <a:endParaRPr lang="en-US"/>
           </a:p>
@@ -4455,7 +4470,7 @@
           <a:p>
             <a:fld id="{0560A9CD-0304-4E0B-9E82-E7E0115DE05B}" type="datetimeFigureOut">
               <a:rPr lang="en-US" smtClean="0"/>
-              <a:t>3/5/2023</a:t>
+              <a:t>3/6/2023</a:t>
             </a:fld>
             <a:endParaRPr lang="en-US"/>
           </a:p>
@@ -4666,7 +4681,7 @@
           <a:p>
             <a:fld id="{0560A9CD-0304-4E0B-9E82-E7E0115DE05B}" type="datetimeFigureOut">
               <a:rPr lang="en-US" smtClean="0"/>
-              <a:t>3/5/2023</a:t>
+              <a:t>3/6/2023</a:t>
             </a:fld>
             <a:endParaRPr lang="en-US"/>
           </a:p>
@@ -30349,12 +30364,8 @@
           <a:lstStyle/>
           <a:p>
             <a:r>
-              <a:rPr lang="en-US"/>
-              <a:t>Some methods </a:t>
-            </a:r>
-            <a:r>
               <a:rPr lang="en-US" dirty="0"/>
-              <a:t>many class have</a:t>
+              <a:t>Some methods many classes have</a:t>
             </a:r>
           </a:p>
         </p:txBody>

</xml_diff>

<commit_message>
unified quotes on slides
</commit_message>
<xml_diff>
--- a/ipsa/slides/classes.pptx
+++ b/ipsa/slides/classes.pptx
@@ -518,11 +518,26 @@
   </pc:docChgLst>
   <pc:docChgLst>
     <pc:chgData name="Gerth Stølting Brodal" userId="04ef4784-6591-4f86-a140-f5c3b108582a" providerId="ADAL" clId="{A91DA5EE-9FE5-4323-8FC4-B1817E7AE0A9}"/>
-    <pc:docChg chg="custSel modSld">
-      <pc:chgData name="Gerth Stølting Brodal" userId="04ef4784-6591-4f86-a140-f5c3b108582a" providerId="ADAL" clId="{A91DA5EE-9FE5-4323-8FC4-B1817E7AE0A9}" dt="2023-03-08T11:29:37.318" v="125" actId="14100"/>
+    <pc:docChg chg="undo custSel modSld">
+      <pc:chgData name="Gerth Stølting Brodal" userId="04ef4784-6591-4f86-a140-f5c3b108582a" providerId="ADAL" clId="{A91DA5EE-9FE5-4323-8FC4-B1817E7AE0A9}" dt="2023-03-10T23:40:34.843" v="133" actId="6549"/>
       <pc:docMkLst>
         <pc:docMk/>
       </pc:docMkLst>
+      <pc:sldChg chg="modSp mod">
+        <pc:chgData name="Gerth Stølting Brodal" userId="04ef4784-6591-4f86-a140-f5c3b108582a" providerId="ADAL" clId="{A91DA5EE-9FE5-4323-8FC4-B1817E7AE0A9}" dt="2023-03-10T23:40:34.843" v="133" actId="6549"/>
+        <pc:sldMkLst>
+          <pc:docMk/>
+          <pc:sldMk cId="4233564356" sldId="647"/>
+        </pc:sldMkLst>
+        <pc:graphicFrameChg chg="modGraphic">
+          <ac:chgData name="Gerth Stølting Brodal" userId="04ef4784-6591-4f86-a140-f5c3b108582a" providerId="ADAL" clId="{A91DA5EE-9FE5-4323-8FC4-B1817E7AE0A9}" dt="2023-03-10T23:40:34.843" v="133" actId="6549"/>
+          <ac:graphicFrameMkLst>
+            <pc:docMk/>
+            <pc:sldMk cId="4233564356" sldId="647"/>
+            <ac:graphicFrameMk id="4" creationId="{00000000-0000-0000-0000-000000000000}"/>
+          </ac:graphicFrameMkLst>
+        </pc:graphicFrameChg>
+      </pc:sldChg>
       <pc:sldChg chg="modNotesTx">
         <pc:chgData name="Gerth Stølting Brodal" userId="04ef4784-6591-4f86-a140-f5c3b108582a" providerId="ADAL" clId="{A91DA5EE-9FE5-4323-8FC4-B1817E7AE0A9}" dt="2023-03-08T08:17:23.389" v="122" actId="20577"/>
         <pc:sldMkLst>
@@ -647,7 +662,7 @@
           <a:p>
             <a:fld id="{FB1A172F-81D4-4DC4-9113-1DBD56EC3646}" type="datetimeFigureOut">
               <a:rPr lang="en-US" smtClean="0"/>
-              <a:t>3/8/2023</a:t>
+              <a:t>3/11/2023</a:t>
             </a:fld>
             <a:endParaRPr lang="en-US"/>
           </a:p>
@@ -2506,7 +2521,7 @@
           <a:p>
             <a:fld id="{0560A9CD-0304-4E0B-9E82-E7E0115DE05B}" type="datetimeFigureOut">
               <a:rPr lang="en-US" smtClean="0"/>
-              <a:t>3/8/2023</a:t>
+              <a:t>3/11/2023</a:t>
             </a:fld>
             <a:endParaRPr lang="en-US"/>
           </a:p>
@@ -2674,7 +2689,7 @@
           <a:p>
             <a:fld id="{0560A9CD-0304-4E0B-9E82-E7E0115DE05B}" type="datetimeFigureOut">
               <a:rPr lang="en-US" smtClean="0"/>
-              <a:t>3/8/2023</a:t>
+              <a:t>3/11/2023</a:t>
             </a:fld>
             <a:endParaRPr lang="en-US"/>
           </a:p>
@@ -2852,7 +2867,7 @@
           <a:p>
             <a:fld id="{0560A9CD-0304-4E0B-9E82-E7E0115DE05B}" type="datetimeFigureOut">
               <a:rPr lang="en-US" smtClean="0"/>
-              <a:t>3/8/2023</a:t>
+              <a:t>3/11/2023</a:t>
             </a:fld>
             <a:endParaRPr lang="en-US"/>
           </a:p>
@@ -3035,7 +3050,7 @@
           <a:p>
             <a:fld id="{0560A9CD-0304-4E0B-9E82-E7E0115DE05B}" type="datetimeFigureOut">
               <a:rPr lang="en-US" smtClean="0"/>
-              <a:t>3/8/2023</a:t>
+              <a:t>3/11/2023</a:t>
             </a:fld>
             <a:endParaRPr lang="en-US"/>
           </a:p>
@@ -3280,7 +3295,7 @@
           <a:p>
             <a:fld id="{0560A9CD-0304-4E0B-9E82-E7E0115DE05B}" type="datetimeFigureOut">
               <a:rPr lang="en-US" smtClean="0"/>
-              <a:t>3/8/2023</a:t>
+              <a:t>3/11/2023</a:t>
             </a:fld>
             <a:endParaRPr lang="en-US"/>
           </a:p>
@@ -3509,7 +3524,7 @@
           <a:p>
             <a:fld id="{0560A9CD-0304-4E0B-9E82-E7E0115DE05B}" type="datetimeFigureOut">
               <a:rPr lang="en-US" smtClean="0"/>
-              <a:t>3/8/2023</a:t>
+              <a:t>3/11/2023</a:t>
             </a:fld>
             <a:endParaRPr lang="en-US"/>
           </a:p>
@@ -3873,7 +3888,7 @@
           <a:p>
             <a:fld id="{0560A9CD-0304-4E0B-9E82-E7E0115DE05B}" type="datetimeFigureOut">
               <a:rPr lang="en-US" smtClean="0"/>
-              <a:t>3/8/2023</a:t>
+              <a:t>3/11/2023</a:t>
             </a:fld>
             <a:endParaRPr lang="en-US"/>
           </a:p>
@@ -3990,7 +4005,7 @@
           <a:p>
             <a:fld id="{0560A9CD-0304-4E0B-9E82-E7E0115DE05B}" type="datetimeFigureOut">
               <a:rPr lang="en-US" smtClean="0"/>
-              <a:t>3/8/2023</a:t>
+              <a:t>3/11/2023</a:t>
             </a:fld>
             <a:endParaRPr lang="en-US"/>
           </a:p>
@@ -4085,7 +4100,7 @@
           <a:p>
             <a:fld id="{0560A9CD-0304-4E0B-9E82-E7E0115DE05B}" type="datetimeFigureOut">
               <a:rPr lang="en-US" smtClean="0"/>
-              <a:t>3/8/2023</a:t>
+              <a:t>3/11/2023</a:t>
             </a:fld>
             <a:endParaRPr lang="en-US"/>
           </a:p>
@@ -4360,7 +4375,7 @@
           <a:p>
             <a:fld id="{0560A9CD-0304-4E0B-9E82-E7E0115DE05B}" type="datetimeFigureOut">
               <a:rPr lang="en-US" smtClean="0"/>
-              <a:t>3/8/2023</a:t>
+              <a:t>3/11/2023</a:t>
             </a:fld>
             <a:endParaRPr lang="en-US"/>
           </a:p>
@@ -4612,7 +4627,7 @@
           <a:p>
             <a:fld id="{0560A9CD-0304-4E0B-9E82-E7E0115DE05B}" type="datetimeFigureOut">
               <a:rPr lang="en-US" smtClean="0"/>
-              <a:t>3/8/2023</a:t>
+              <a:t>3/11/2023</a:t>
             </a:fld>
             <a:endParaRPr lang="en-US"/>
           </a:p>
@@ -4823,7 +4838,7 @@
           <a:p>
             <a:fld id="{0560A9CD-0304-4E0B-9E82-E7E0115DE05B}" type="datetimeFigureOut">
               <a:rPr lang="en-US" smtClean="0"/>
-              <a:t>3/8/2023</a:t>
+              <a:t>3/11/2023</a:t>
             </a:fld>
             <a:endParaRPr lang="en-US"/>
           </a:p>
@@ -37303,7 +37318,7 @@
           <p:nvPr>
             <p:extLst>
               <p:ext uri="{D42A27DB-BD31-4B8C-83A1-F6EECF244321}">
-                <p14:modId xmlns:p14="http://schemas.microsoft.com/office/powerpoint/2010/main" val="1658593633"/>
+                <p14:modId xmlns:p14="http://schemas.microsoft.com/office/powerpoint/2010/main" val="3997683888"/>
               </p:ext>
             </p:extLst>
           </p:nvPr>
@@ -37708,12 +37723,16 @@
                     </a:p>
                     <a:p>
                       <a:r>
-                        <a:rPr lang="pt-BR" sz="1800" b="1" dirty="0">
-                          <a:latin typeface="Courier New" panose="02070309020205020404" pitchFamily="49" charset="0"/>
-                          <a:cs typeface="Courier New" panose="02070309020205020404" pitchFamily="49" charset="0"/>
-                        </a:rPr>
-                        <a:t>          "has id",</a:t>
-                      </a:r>
+                        <a:rPr lang="pt-BR" sz="1800" b="1">
+                          <a:latin typeface="Courier New" panose="02070309020205020404" pitchFamily="49" charset="0"/>
+                          <a:cs typeface="Courier New" panose="02070309020205020404" pitchFamily="49" charset="0"/>
+                        </a:rPr>
+                        <a:t>          'has id',</a:t>
+                      </a:r>
+                      <a:endParaRPr lang="pt-BR" sz="1800" b="1" dirty="0">
+                        <a:latin typeface="Courier New" panose="02070309020205020404" pitchFamily="49" charset="0"/>
+                        <a:cs typeface="Courier New" panose="02070309020205020404" pitchFamily="49" charset="0"/>
+                      </a:endParaRPr>
                     </a:p>
                     <a:p>
                       <a:r>

</xml_diff>

<commit_message>
exercises.html all-slides.pdf classes.pdf classes.pptx code.zip lambda.pdf lambda.pptx recursion_iteration.pdf recursion_iteration.pptx
</commit_message>
<xml_diff>
--- a/ipsa/slides/classes.pptx
+++ b/ipsa/slides/classes.pptx
@@ -143,6 +143,14 @@
 </p:presentation>
 </file>
 
+<file path=ppt/revisionInfo.xml><?xml version="1.0" encoding="utf-8"?>
+<p1510:revInfo xmlns:a="http://schemas.openxmlformats.org/drawingml/2006/main" xmlns:r="http://schemas.openxmlformats.org/officeDocument/2006/relationships" xmlns:p1510="http://schemas.microsoft.com/office/powerpoint/2015/10/main">
+  <p1510:revLst>
+    <p1510:client id="{9D905D2A-7BDA-40BC-B748-BD3D6CCF9001}" v="1" dt="2025-03-03T17:00:55.221"/>
+  </p1510:revLst>
+</p1510:revInfo>
+</file>
+
 <file path=ppt/changesInfos/changesInfo1.xml><?xml version="1.0" encoding="utf-8"?>
 <pc:chgInfo xmlns:a="http://schemas.openxmlformats.org/drawingml/2006/main" xmlns:r="http://schemas.openxmlformats.org/officeDocument/2006/relationships" xmlns:ac="http://schemas.microsoft.com/office/drawing/2013/main/command" xmlns:pc="http://schemas.microsoft.com/office/powerpoint/2013/main/command">
   <pc:docChgLst>
@@ -158,14 +166,6 @@
           <pc:docMk/>
           <pc:sldMk cId="2384964314" sldId="616"/>
         </pc:sldMkLst>
-        <pc:spChg chg="mod">
-          <ac:chgData name="Gerth Stølting" userId="04ef4784-6591-4f86-a140-f5c3b108582a" providerId="ADAL" clId="{A91DA5EE-9FE5-4323-8FC4-B1817E7AE0A9}" dt="2023-03-05T16:39:18.066" v="25" actId="6549"/>
-          <ac:spMkLst>
-            <pc:docMk/>
-            <pc:sldMk cId="2384964314" sldId="616"/>
-            <ac:spMk id="3" creationId="{00000000-0000-0000-0000-000000000000}"/>
-          </ac:spMkLst>
-        </pc:spChg>
       </pc:sldChg>
       <pc:sldChg chg="modSp mod">
         <pc:chgData name="Gerth Stølting" userId="04ef4784-6591-4f86-a140-f5c3b108582a" providerId="ADAL" clId="{A91DA5EE-9FE5-4323-8FC4-B1817E7AE0A9}" dt="2023-03-06T11:20:13.285" v="115" actId="20577"/>
@@ -173,14 +173,6 @@
           <pc:docMk/>
           <pc:sldMk cId="3634352186" sldId="619"/>
         </pc:sldMkLst>
-        <pc:spChg chg="mod">
-          <ac:chgData name="Gerth Stølting" userId="04ef4784-6591-4f86-a140-f5c3b108582a" providerId="ADAL" clId="{A91DA5EE-9FE5-4323-8FC4-B1817E7AE0A9}" dt="2023-03-06T11:20:13.285" v="115" actId="20577"/>
-          <ac:spMkLst>
-            <pc:docMk/>
-            <pc:sldMk cId="3634352186" sldId="619"/>
-            <ac:spMk id="2" creationId="{00000000-0000-0000-0000-000000000000}"/>
-          </ac:spMkLst>
-        </pc:spChg>
       </pc:sldChg>
       <pc:sldChg chg="modNotesTx">
         <pc:chgData name="Gerth Stølting" userId="04ef4784-6591-4f86-a140-f5c3b108582a" providerId="ADAL" clId="{A91DA5EE-9FE5-4323-8FC4-B1817E7AE0A9}" dt="2023-03-05T16:30:34.937" v="18" actId="20577"/>
@@ -195,22 +187,6 @@
           <pc:docMk/>
           <pc:sldMk cId="888733723" sldId="655"/>
         </pc:sldMkLst>
-        <pc:spChg chg="mod">
-          <ac:chgData name="Gerth Stølting" userId="04ef4784-6591-4f86-a140-f5c3b108582a" providerId="ADAL" clId="{A91DA5EE-9FE5-4323-8FC4-B1817E7AE0A9}" dt="2023-03-05T17:11:01.348" v="106" actId="1037"/>
-          <ac:spMkLst>
-            <pc:docMk/>
-            <pc:sldMk cId="888733723" sldId="655"/>
-            <ac:spMk id="2" creationId="{00000000-0000-0000-0000-000000000000}"/>
-          </ac:spMkLst>
-        </pc:spChg>
-        <pc:spChg chg="mod">
-          <ac:chgData name="Gerth Stølting" userId="04ef4784-6591-4f86-a140-f5c3b108582a" providerId="ADAL" clId="{A91DA5EE-9FE5-4323-8FC4-B1817E7AE0A9}" dt="2023-03-05T17:10:25.404" v="96" actId="1035"/>
-          <ac:spMkLst>
-            <pc:docMk/>
-            <pc:sldMk cId="888733723" sldId="655"/>
-            <ac:spMk id="3" creationId="{00000000-0000-0000-0000-000000000000}"/>
-          </ac:spMkLst>
-        </pc:spChg>
       </pc:sldChg>
       <pc:sldChg chg="modSp mod modNotesTx">
         <pc:chgData name="Gerth Stølting" userId="04ef4784-6591-4f86-a140-f5c3b108582a" providerId="ADAL" clId="{A91DA5EE-9FE5-4323-8FC4-B1817E7AE0A9}" dt="2023-03-05T17:18:40.515" v="109" actId="20577"/>
@@ -218,14 +194,6 @@
           <pc:docMk/>
           <pc:sldMk cId="2163815290" sldId="656"/>
         </pc:sldMkLst>
-        <pc:spChg chg="mod">
-          <ac:chgData name="Gerth Stølting" userId="04ef4784-6591-4f86-a140-f5c3b108582a" providerId="ADAL" clId="{A91DA5EE-9FE5-4323-8FC4-B1817E7AE0A9}" dt="2023-03-05T17:18:40.515" v="109" actId="20577"/>
-          <ac:spMkLst>
-            <pc:docMk/>
-            <pc:sldMk cId="2163815290" sldId="656"/>
-            <ac:spMk id="3" creationId="{00000000-0000-0000-0000-000000000000}"/>
-          </ac:spMkLst>
-        </pc:spChg>
       </pc:sldChg>
       <pc:sldChg chg="modSp mod">
         <pc:chgData name="Gerth Stølting" userId="04ef4784-6591-4f86-a140-f5c3b108582a" providerId="ADAL" clId="{A91DA5EE-9FE5-4323-8FC4-B1817E7AE0A9}" dt="2023-03-05T17:03:01.420" v="69" actId="20577"/>
@@ -233,14 +201,6 @@
           <pc:docMk/>
           <pc:sldMk cId="1185943605" sldId="657"/>
         </pc:sldMkLst>
-        <pc:graphicFrameChg chg="modGraphic">
-          <ac:chgData name="Gerth Stølting" userId="04ef4784-6591-4f86-a140-f5c3b108582a" providerId="ADAL" clId="{A91DA5EE-9FE5-4323-8FC4-B1817E7AE0A9}" dt="2023-03-05T17:03:01.420" v="69" actId="20577"/>
-          <ac:graphicFrameMkLst>
-            <pc:docMk/>
-            <pc:sldMk cId="1185943605" sldId="657"/>
-            <ac:graphicFrameMk id="4" creationId="{00000000-0000-0000-0000-000000000000}"/>
-          </ac:graphicFrameMkLst>
-        </pc:graphicFrameChg>
       </pc:sldChg>
       <pc:sldChg chg="addSp modSp mod">
         <pc:chgData name="Gerth Stølting" userId="04ef4784-6591-4f86-a140-f5c3b108582a" providerId="ADAL" clId="{A91DA5EE-9FE5-4323-8FC4-B1817E7AE0A9}" dt="2023-03-05T16:57:52.404" v="61" actId="20577"/>
@@ -248,22 +208,6 @@
           <pc:docMk/>
           <pc:sldMk cId="1240346704" sldId="659"/>
         </pc:sldMkLst>
-        <pc:graphicFrameChg chg="modGraphic">
-          <ac:chgData name="Gerth Stølting" userId="04ef4784-6591-4f86-a140-f5c3b108582a" providerId="ADAL" clId="{A91DA5EE-9FE5-4323-8FC4-B1817E7AE0A9}" dt="2023-03-05T16:57:52.404" v="61" actId="20577"/>
-          <ac:graphicFrameMkLst>
-            <pc:docMk/>
-            <pc:sldMk cId="1240346704" sldId="659"/>
-            <ac:graphicFrameMk id="4" creationId="{00000000-0000-0000-0000-000000000000}"/>
-          </ac:graphicFrameMkLst>
-        </pc:graphicFrameChg>
-        <pc:graphicFrameChg chg="add mod">
-          <ac:chgData name="Gerth Stølting" userId="04ef4784-6591-4f86-a140-f5c3b108582a" providerId="ADAL" clId="{A91DA5EE-9FE5-4323-8FC4-B1817E7AE0A9}" dt="2023-03-05T16:56:03.054" v="47"/>
-          <ac:graphicFrameMkLst>
-            <pc:docMk/>
-            <pc:sldMk cId="1240346704" sldId="659"/>
-            <ac:graphicFrameMk id="5" creationId="{1FEF7243-BC69-E9FA-33F4-DB905F8B51D3}"/>
-          </ac:graphicFrameMkLst>
-        </pc:graphicFrameChg>
       </pc:sldChg>
       <pc:sldChg chg="modSp mod">
         <pc:chgData name="Gerth Stølting" userId="04ef4784-6591-4f86-a140-f5c3b108582a" providerId="ADAL" clId="{A91DA5EE-9FE5-4323-8FC4-B1817E7AE0A9}" dt="2023-03-05T17:09:56.895" v="94" actId="1038"/>
@@ -271,14 +215,6 @@
           <pc:docMk/>
           <pc:sldMk cId="763960458" sldId="661"/>
         </pc:sldMkLst>
-        <pc:spChg chg="mod">
-          <ac:chgData name="Gerth Stølting" userId="04ef4784-6591-4f86-a140-f5c3b108582a" providerId="ADAL" clId="{A91DA5EE-9FE5-4323-8FC4-B1817E7AE0A9}" dt="2023-03-05T17:09:56.895" v="94" actId="1038"/>
-          <ac:spMkLst>
-            <pc:docMk/>
-            <pc:sldMk cId="763960458" sldId="661"/>
-            <ac:spMk id="5" creationId="{00000000-0000-0000-0000-000000000000}"/>
-          </ac:spMkLst>
-        </pc:spChg>
       </pc:sldChg>
     </pc:docChg>
   </pc:docChgLst>
@@ -302,14 +238,6 @@
           <pc:docMk/>
           <pc:sldMk cId="3634352186" sldId="619"/>
         </pc:sldMkLst>
-        <pc:graphicFrameChg chg="modGraphic">
-          <ac:chgData name="Gerth Stølting Brodal" userId="04ef4784-6591-4f86-a140-f5c3b108582a" providerId="ADAL" clId="{EB9FA8FA-BADF-4E7D-BE01-FF9053D656BF}" dt="2021-03-09T06:36:43.262" v="119" actId="242"/>
-          <ac:graphicFrameMkLst>
-            <pc:docMk/>
-            <pc:sldMk cId="3634352186" sldId="619"/>
-            <ac:graphicFrameMk id="4" creationId="{00000000-0000-0000-0000-000000000000}"/>
-          </ac:graphicFrameMkLst>
-        </pc:graphicFrameChg>
       </pc:sldChg>
       <pc:sldChg chg="modSp mod modNotesTx">
         <pc:chgData name="Gerth Stølting Brodal" userId="04ef4784-6591-4f86-a140-f5c3b108582a" providerId="ADAL" clId="{EB9FA8FA-BADF-4E7D-BE01-FF9053D656BF}" dt="2021-03-09T06:42:19.291" v="242" actId="20577"/>
@@ -317,30 +245,6 @@
           <pc:docMk/>
           <pc:sldMk cId="172260989" sldId="640"/>
         </pc:sldMkLst>
-        <pc:spChg chg="mod">
-          <ac:chgData name="Gerth Stølting Brodal" userId="04ef4784-6591-4f86-a140-f5c3b108582a" providerId="ADAL" clId="{EB9FA8FA-BADF-4E7D-BE01-FF9053D656BF}" dt="2021-03-09T06:41:26.091" v="140" actId="20577"/>
-          <ac:spMkLst>
-            <pc:docMk/>
-            <pc:sldMk cId="172260989" sldId="640"/>
-            <ac:spMk id="6" creationId="{00000000-0000-0000-0000-000000000000}"/>
-          </ac:spMkLst>
-        </pc:spChg>
-        <pc:graphicFrameChg chg="mod">
-          <ac:chgData name="Gerth Stølting Brodal" userId="04ef4784-6591-4f86-a140-f5c3b108582a" providerId="ADAL" clId="{EB9FA8FA-BADF-4E7D-BE01-FF9053D656BF}" dt="2021-03-09T06:28:43.516" v="46" actId="1035"/>
-          <ac:graphicFrameMkLst>
-            <pc:docMk/>
-            <pc:sldMk cId="172260989" sldId="640"/>
-            <ac:graphicFrameMk id="4" creationId="{00000000-0000-0000-0000-000000000000}"/>
-          </ac:graphicFrameMkLst>
-        </pc:graphicFrameChg>
-        <pc:graphicFrameChg chg="mod modGraphic">
-          <ac:chgData name="Gerth Stølting Brodal" userId="04ef4784-6591-4f86-a140-f5c3b108582a" providerId="ADAL" clId="{EB9FA8FA-BADF-4E7D-BE01-FF9053D656BF}" dt="2021-03-09T06:28:43.516" v="46" actId="1035"/>
-          <ac:graphicFrameMkLst>
-            <pc:docMk/>
-            <pc:sldMk cId="172260989" sldId="640"/>
-            <ac:graphicFrameMk id="5" creationId="{00000000-0000-0000-0000-000000000000}"/>
-          </ac:graphicFrameMkLst>
-        </pc:graphicFrameChg>
       </pc:sldChg>
       <pc:sldChg chg="addSp modSp mod modAnim">
         <pc:chgData name="Gerth Stølting Brodal" userId="04ef4784-6591-4f86-a140-f5c3b108582a" providerId="ADAL" clId="{EB9FA8FA-BADF-4E7D-BE01-FF9053D656BF}" dt="2021-03-09T07:19:10.582" v="1389" actId="1036"/>
@@ -348,94 +252,6 @@
           <pc:docMk/>
           <pc:sldMk cId="1249989982" sldId="644"/>
         </pc:sldMkLst>
-        <pc:spChg chg="mod">
-          <ac:chgData name="Gerth Stølting Brodal" userId="04ef4784-6591-4f86-a140-f5c3b108582a" providerId="ADAL" clId="{EB9FA8FA-BADF-4E7D-BE01-FF9053D656BF}" dt="2021-03-09T07:17:40.418" v="1371" actId="1038"/>
-          <ac:spMkLst>
-            <pc:docMk/>
-            <pc:sldMk cId="1249989982" sldId="644"/>
-            <ac:spMk id="25" creationId="{00000000-0000-0000-0000-000000000000}"/>
-          </ac:spMkLst>
-        </pc:spChg>
-        <pc:spChg chg="mod">
-          <ac:chgData name="Gerth Stølting Brodal" userId="04ef4784-6591-4f86-a140-f5c3b108582a" providerId="ADAL" clId="{EB9FA8FA-BADF-4E7D-BE01-FF9053D656BF}" dt="2021-03-09T07:18:28.844" v="1379" actId="1076"/>
-          <ac:spMkLst>
-            <pc:docMk/>
-            <pc:sldMk cId="1249989982" sldId="644"/>
-            <ac:spMk id="29" creationId="{9B6C28E5-F5C8-487A-B19B-23CD331EF8CD}"/>
-          </ac:spMkLst>
-        </pc:spChg>
-        <pc:grpChg chg="add mod">
-          <ac:chgData name="Gerth Stølting Brodal" userId="04ef4784-6591-4f86-a140-f5c3b108582a" providerId="ADAL" clId="{EB9FA8FA-BADF-4E7D-BE01-FF9053D656BF}" dt="2021-03-09T07:18:36.804" v="1380" actId="1076"/>
-          <ac:grpSpMkLst>
-            <pc:docMk/>
-            <pc:sldMk cId="1249989982" sldId="644"/>
-            <ac:grpSpMk id="27" creationId="{F79EBC16-68DA-4E82-8FAA-9AA5C3343F7A}"/>
-          </ac:grpSpMkLst>
-        </pc:grpChg>
-        <pc:grpChg chg="mod">
-          <ac:chgData name="Gerth Stølting Brodal" userId="04ef4784-6591-4f86-a140-f5c3b108582a" providerId="ADAL" clId="{EB9FA8FA-BADF-4E7D-BE01-FF9053D656BF}" dt="2021-03-09T07:15:32.670" v="1293"/>
-          <ac:grpSpMkLst>
-            <pc:docMk/>
-            <pc:sldMk cId="1249989982" sldId="644"/>
-            <ac:grpSpMk id="30" creationId="{F64D4BF0-D871-4525-A362-16BB4E26C535}"/>
-          </ac:grpSpMkLst>
-        </pc:grpChg>
-        <pc:grpChg chg="mod">
-          <ac:chgData name="Gerth Stølting Brodal" userId="04ef4784-6591-4f86-a140-f5c3b108582a" providerId="ADAL" clId="{EB9FA8FA-BADF-4E7D-BE01-FF9053D656BF}" dt="2021-03-09T07:15:31.667" v="1292" actId="1076"/>
-          <ac:grpSpMkLst>
-            <pc:docMk/>
-            <pc:sldMk cId="1249989982" sldId="644"/>
-            <ac:grpSpMk id="39" creationId="{00000000-0000-0000-0000-000000000000}"/>
-          </ac:grpSpMkLst>
-        </pc:grpChg>
-        <pc:grpChg chg="mod">
-          <ac:chgData name="Gerth Stølting Brodal" userId="04ef4784-6591-4f86-a140-f5c3b108582a" providerId="ADAL" clId="{EB9FA8FA-BADF-4E7D-BE01-FF9053D656BF}" dt="2021-03-09T07:19:10.582" v="1389" actId="1036"/>
-          <ac:grpSpMkLst>
-            <pc:docMk/>
-            <pc:sldMk cId="1249989982" sldId="644"/>
-            <ac:grpSpMk id="42" creationId="{00000000-0000-0000-0000-000000000000}"/>
-          </ac:grpSpMkLst>
-        </pc:grpChg>
-        <pc:grpChg chg="mod">
-          <ac:chgData name="Gerth Stølting Brodal" userId="04ef4784-6591-4f86-a140-f5c3b108582a" providerId="ADAL" clId="{EB9FA8FA-BADF-4E7D-BE01-FF9053D656BF}" dt="2021-03-09T07:19:10.582" v="1389" actId="1036"/>
-          <ac:grpSpMkLst>
-            <pc:docMk/>
-            <pc:sldMk cId="1249989982" sldId="644"/>
-            <ac:grpSpMk id="43" creationId="{00000000-0000-0000-0000-000000000000}"/>
-          </ac:grpSpMkLst>
-        </pc:grpChg>
-        <pc:graphicFrameChg chg="mod modGraphic">
-          <ac:chgData name="Gerth Stølting Brodal" userId="04ef4784-6591-4f86-a140-f5c3b108582a" providerId="ADAL" clId="{EB9FA8FA-BADF-4E7D-BE01-FF9053D656BF}" dt="2021-03-09T07:15:20.718" v="1291" actId="1076"/>
-          <ac:graphicFrameMkLst>
-            <pc:docMk/>
-            <pc:sldMk cId="1249989982" sldId="644"/>
-            <ac:graphicFrameMk id="5" creationId="{00000000-0000-0000-0000-000000000000}"/>
-          </ac:graphicFrameMkLst>
-        </pc:graphicFrameChg>
-        <pc:cxnChg chg="mod">
-          <ac:chgData name="Gerth Stølting Brodal" userId="04ef4784-6591-4f86-a140-f5c3b108582a" providerId="ADAL" clId="{EB9FA8FA-BADF-4E7D-BE01-FF9053D656BF}" dt="2021-03-09T07:17:36.811" v="1366" actId="1036"/>
-          <ac:cxnSpMkLst>
-            <pc:docMk/>
-            <pc:sldMk cId="1249989982" sldId="644"/>
-            <ac:cxnSpMk id="15" creationId="{00000000-0000-0000-0000-000000000000}"/>
-          </ac:cxnSpMkLst>
-        </pc:cxnChg>
-        <pc:cxnChg chg="mod">
-          <ac:chgData name="Gerth Stølting Brodal" userId="04ef4784-6591-4f86-a140-f5c3b108582a" providerId="ADAL" clId="{EB9FA8FA-BADF-4E7D-BE01-FF9053D656BF}" dt="2021-03-09T07:15:32.670" v="1293"/>
-          <ac:cxnSpMkLst>
-            <pc:docMk/>
-            <pc:sldMk cId="1249989982" sldId="644"/>
-            <ac:cxnSpMk id="34" creationId="{B9188330-EDB0-4B00-8449-F86B3BD57DED}"/>
-          </ac:cxnSpMkLst>
-        </pc:cxnChg>
-        <pc:cxnChg chg="mod">
-          <ac:chgData name="Gerth Stølting Brodal" userId="04ef4784-6591-4f86-a140-f5c3b108582a" providerId="ADAL" clId="{EB9FA8FA-BADF-4E7D-BE01-FF9053D656BF}" dt="2021-03-09T07:16:42.381" v="1355" actId="14100"/>
-          <ac:cxnSpMkLst>
-            <pc:docMk/>
-            <pc:sldMk cId="1249989982" sldId="644"/>
-            <ac:cxnSpMk id="35" creationId="{C8348190-5FBF-41D1-8ACA-82E778F7AA36}"/>
-          </ac:cxnSpMkLst>
-        </pc:cxnChg>
       </pc:sldChg>
       <pc:sldChg chg="addSp delSp modSp">
         <pc:chgData name="Gerth Stølting Brodal" userId="04ef4784-6591-4f86-a140-f5c3b108582a" providerId="ADAL" clId="{EB9FA8FA-BADF-4E7D-BE01-FF9053D656BF}" dt="2021-03-09T06:47:34.163" v="265"/>
@@ -443,14 +259,6 @@
           <pc:docMk/>
           <pc:sldMk cId="2163815290" sldId="656"/>
         </pc:sldMkLst>
-        <pc:graphicFrameChg chg="add del mod">
-          <ac:chgData name="Gerth Stølting Brodal" userId="04ef4784-6591-4f86-a140-f5c3b108582a" providerId="ADAL" clId="{EB9FA8FA-BADF-4E7D-BE01-FF9053D656BF}" dt="2021-03-09T06:47:34.163" v="265"/>
-          <ac:graphicFrameMkLst>
-            <pc:docMk/>
-            <pc:sldMk cId="2163815290" sldId="656"/>
-            <ac:graphicFrameMk id="5" creationId="{2A071E03-9BA0-4FB6-AEC1-0684A8BF80C3}"/>
-          </ac:graphicFrameMkLst>
-        </pc:graphicFrameChg>
       </pc:sldChg>
       <pc:sldChg chg="modNotesTx">
         <pc:chgData name="Gerth Stølting Brodal" userId="04ef4784-6591-4f86-a140-f5c3b108582a" providerId="ADAL" clId="{EB9FA8FA-BADF-4E7D-BE01-FF9053D656BF}" dt="2021-03-09T06:39:27.065" v="139" actId="20577"/>
@@ -465,44 +273,58 @@
           <pc:docMk/>
           <pc:sldMk cId="672956344" sldId="677"/>
         </pc:sldMkLst>
+      </pc:sldChg>
+    </pc:docChg>
+  </pc:docChgLst>
+  <pc:docChgLst>
+    <pc:chgData name="Gerth Stølting Brodal" userId="04ef4784-6591-4f86-a140-f5c3b108582a" providerId="ADAL" clId="{9D905D2A-7BDA-40BC-B748-BD3D6CCF9001}"/>
+    <pc:docChg chg="custSel modSld">
+      <pc:chgData name="Gerth Stølting Brodal" userId="04ef4784-6591-4f86-a140-f5c3b108582a" providerId="ADAL" clId="{9D905D2A-7BDA-40BC-B748-BD3D6CCF9001}" dt="2025-03-03T17:02:52.756" v="65" actId="1076"/>
+      <pc:docMkLst>
+        <pc:docMk/>
+      </pc:docMkLst>
+      <pc:sldChg chg="modNotesTx">
+        <pc:chgData name="Gerth Stølting Brodal" userId="04ef4784-6591-4f86-a140-f5c3b108582a" providerId="ADAL" clId="{9D905D2A-7BDA-40BC-B748-BD3D6CCF9001}" dt="2025-03-03T08:51:24.734" v="54" actId="20577"/>
+        <pc:sldMkLst>
+          <pc:docMk/>
+          <pc:sldMk cId="3634352186" sldId="619"/>
+        </pc:sldMkLst>
+      </pc:sldChg>
+      <pc:sldChg chg="modSp mod">
+        <pc:chgData name="Gerth Stølting Brodal" userId="04ef4784-6591-4f86-a140-f5c3b108582a" providerId="ADAL" clId="{9D905D2A-7BDA-40BC-B748-BD3D6CCF9001}" dt="2025-03-03T08:47:54.772" v="0" actId="20577"/>
+        <pc:sldMkLst>
+          <pc:docMk/>
+          <pc:sldMk cId="860418074" sldId="639"/>
+        </pc:sldMkLst>
         <pc:spChg chg="mod">
-          <ac:chgData name="Gerth Stølting Brodal" userId="04ef4784-6591-4f86-a140-f5c3b108582a" providerId="ADAL" clId="{EB9FA8FA-BADF-4E7D-BE01-FF9053D656BF}" dt="2021-03-09T07:05:36.396" v="941" actId="20577"/>
+          <ac:chgData name="Gerth Stølting Brodal" userId="04ef4784-6591-4f86-a140-f5c3b108582a" providerId="ADAL" clId="{9D905D2A-7BDA-40BC-B748-BD3D6CCF9001}" dt="2025-03-03T08:47:54.772" v="0" actId="20577"/>
           <ac:spMkLst>
             <pc:docMk/>
-            <pc:sldMk cId="672956344" sldId="677"/>
-            <ac:spMk id="2" creationId="{97A22691-6935-4323-BF7E-DD0D3FF821DA}"/>
+            <pc:sldMk cId="860418074" sldId="639"/>
+            <ac:spMk id="3" creationId="{00000000-0000-0000-0000-000000000000}"/>
           </ac:spMkLst>
         </pc:spChg>
-        <pc:spChg chg="del">
-          <ac:chgData name="Gerth Stølting Brodal" userId="04ef4784-6591-4f86-a140-f5c3b108582a" providerId="ADAL" clId="{EB9FA8FA-BADF-4E7D-BE01-FF9053D656BF}" dt="2021-03-09T06:47:15.554" v="259" actId="478"/>
+      </pc:sldChg>
+      <pc:sldChg chg="modSp mod">
+        <pc:chgData name="Gerth Stølting Brodal" userId="04ef4784-6591-4f86-a140-f5c3b108582a" providerId="ADAL" clId="{9D905D2A-7BDA-40BC-B748-BD3D6CCF9001}" dt="2025-03-03T17:02:52.756" v="65" actId="1076"/>
+        <pc:sldMkLst>
+          <pc:docMk/>
+          <pc:sldMk cId="1240346704" sldId="659"/>
+        </pc:sldMkLst>
+        <pc:spChg chg="mod">
+          <ac:chgData name="Gerth Stølting Brodal" userId="04ef4784-6591-4f86-a140-f5c3b108582a" providerId="ADAL" clId="{9D905D2A-7BDA-40BC-B748-BD3D6CCF9001}" dt="2025-03-03T17:01:37.559" v="64" actId="14100"/>
           <ac:spMkLst>
             <pc:docMk/>
-            <pc:sldMk cId="672956344" sldId="677"/>
-            <ac:spMk id="3" creationId="{79B251B2-D99F-46D6-9426-87589D7403BF}"/>
+            <pc:sldMk cId="1240346704" sldId="659"/>
+            <ac:spMk id="3" creationId="{00000000-0000-0000-0000-000000000000}"/>
           </ac:spMkLst>
         </pc:spChg>
-        <pc:spChg chg="add del mod">
-          <ac:chgData name="Gerth Stølting Brodal" userId="04ef4784-6591-4f86-a140-f5c3b108582a" providerId="ADAL" clId="{EB9FA8FA-BADF-4E7D-BE01-FF9053D656BF}" dt="2021-03-09T06:47:17.088" v="261"/>
-          <ac:spMkLst>
-            <pc:docMk/>
-            <pc:sldMk cId="672956344" sldId="677"/>
-            <ac:spMk id="4" creationId="{2D153A25-4222-4B1B-A10D-26F25AEC1C70}"/>
-          </ac:spMkLst>
-        </pc:spChg>
-        <pc:spChg chg="add del mod">
-          <ac:chgData name="Gerth Stølting Brodal" userId="04ef4784-6591-4f86-a140-f5c3b108582a" providerId="ADAL" clId="{EB9FA8FA-BADF-4E7D-BE01-FF9053D656BF}" dt="2021-03-09T06:47:27.466" v="263"/>
-          <ac:spMkLst>
-            <pc:docMk/>
-            <pc:sldMk cId="672956344" sldId="677"/>
-            <ac:spMk id="5" creationId="{B418D256-D950-4CD8-AD70-9F3A6442BF40}"/>
-          </ac:spMkLst>
-        </pc:spChg>
-        <pc:graphicFrameChg chg="add mod modGraphic">
-          <ac:chgData name="Gerth Stølting Brodal" userId="04ef4784-6591-4f86-a140-f5c3b108582a" providerId="ADAL" clId="{EB9FA8FA-BADF-4E7D-BE01-FF9053D656BF}" dt="2021-03-09T07:19:51.965" v="1390" actId="20577"/>
+        <pc:graphicFrameChg chg="mod modGraphic">
+          <ac:chgData name="Gerth Stølting Brodal" userId="04ef4784-6591-4f86-a140-f5c3b108582a" providerId="ADAL" clId="{9D905D2A-7BDA-40BC-B748-BD3D6CCF9001}" dt="2025-03-03T17:02:52.756" v="65" actId="1076"/>
           <ac:graphicFrameMkLst>
             <pc:docMk/>
-            <pc:sldMk cId="672956344" sldId="677"/>
-            <ac:graphicFrameMk id="6" creationId="{DFAC4F92-C1E1-4968-8DE4-029350FF6B1A}"/>
+            <pc:sldMk cId="1240346704" sldId="659"/>
+            <ac:graphicFrameMk id="4" creationId="{00000000-0000-0000-0000-000000000000}"/>
           </ac:graphicFrameMkLst>
         </pc:graphicFrameChg>
       </pc:sldChg>
@@ -521,14 +343,6 @@
           <pc:docMk/>
           <pc:sldMk cId="4233564356" sldId="647"/>
         </pc:sldMkLst>
-        <pc:graphicFrameChg chg="modGraphic">
-          <ac:chgData name="Gerth Stølting Brodal" userId="04ef4784-6591-4f86-a140-f5c3b108582a" providerId="ADAL" clId="{A91DA5EE-9FE5-4323-8FC4-B1817E7AE0A9}" dt="2023-03-10T23:40:34.843" v="133" actId="6549"/>
-          <ac:graphicFrameMkLst>
-            <pc:docMk/>
-            <pc:sldMk cId="4233564356" sldId="647"/>
-            <ac:graphicFrameMk id="4" creationId="{00000000-0000-0000-0000-000000000000}"/>
-          </ac:graphicFrameMkLst>
-        </pc:graphicFrameChg>
       </pc:sldChg>
       <pc:sldChg chg="modNotesTx">
         <pc:chgData name="Gerth Stølting Brodal" userId="04ef4784-6591-4f86-a140-f5c3b108582a" providerId="ADAL" clId="{A91DA5EE-9FE5-4323-8FC4-B1817E7AE0A9}" dt="2023-03-08T08:17:23.389" v="122" actId="20577"/>
@@ -543,14 +357,6 @@
           <pc:docMk/>
           <pc:sldMk cId="1185943605" sldId="657"/>
         </pc:sldMkLst>
-        <pc:spChg chg="mod">
-          <ac:chgData name="Gerth Stølting Brodal" userId="04ef4784-6591-4f86-a140-f5c3b108582a" providerId="ADAL" clId="{A91DA5EE-9FE5-4323-8FC4-B1817E7AE0A9}" dt="2023-03-08T08:14:55.611" v="1" actId="1035"/>
-          <ac:spMkLst>
-            <pc:docMk/>
-            <pc:sldMk cId="1185943605" sldId="657"/>
-            <ac:spMk id="3" creationId="{00000000-0000-0000-0000-000000000000}"/>
-          </ac:spMkLst>
-        </pc:spChg>
       </pc:sldChg>
       <pc:sldChg chg="modSp mod">
         <pc:chgData name="Gerth Stølting Brodal" userId="04ef4784-6591-4f86-a140-f5c3b108582a" providerId="ADAL" clId="{A91DA5EE-9FE5-4323-8FC4-B1817E7AE0A9}" dt="2023-03-08T11:29:37.318" v="125" actId="14100"/>
@@ -558,14 +364,6 @@
           <pc:docMk/>
           <pc:sldMk cId="2050772099" sldId="669"/>
         </pc:sldMkLst>
-        <pc:spChg chg="mod">
-          <ac:chgData name="Gerth Stølting Brodal" userId="04ef4784-6591-4f86-a140-f5c3b108582a" providerId="ADAL" clId="{A91DA5EE-9FE5-4323-8FC4-B1817E7AE0A9}" dt="2023-03-08T11:29:37.318" v="125" actId="14100"/>
-          <ac:spMkLst>
-            <pc:docMk/>
-            <pc:sldMk cId="2050772099" sldId="669"/>
-            <ac:spMk id="5" creationId="{00000000-0000-0000-0000-000000000000}"/>
-          </ac:spMkLst>
-        </pc:spChg>
       </pc:sldChg>
     </pc:docChg>
   </pc:docChgLst>
@@ -582,14 +380,6 @@
           <pc:docMk/>
           <pc:sldMk cId="2384964314" sldId="616"/>
         </pc:sldMkLst>
-        <pc:spChg chg="mod">
-          <ac:chgData name="Gerth Stølting Brodal" userId="04ef4784-6591-4f86-a140-f5c3b108582a" providerId="ADAL" clId="{0503BB6B-FBF1-446E-8B69-27FAE64E3F3E}" dt="2024-03-04T07:58:48.778" v="56" actId="20577"/>
-          <ac:spMkLst>
-            <pc:docMk/>
-            <pc:sldMk cId="2384964314" sldId="616"/>
-            <ac:spMk id="3" creationId="{00000000-0000-0000-0000-000000000000}"/>
-          </ac:spMkLst>
-        </pc:spChg>
       </pc:sldChg>
       <pc:sldChg chg="modSp mod">
         <pc:chgData name="Gerth Stølting Brodal" userId="04ef4784-6591-4f86-a140-f5c3b108582a" providerId="ADAL" clId="{0503BB6B-FBF1-446E-8B69-27FAE64E3F3E}" dt="2024-03-03T19:56:06.701" v="6" actId="14734"/>
@@ -597,14 +387,6 @@
           <pc:docMk/>
           <pc:sldMk cId="3634352186" sldId="619"/>
         </pc:sldMkLst>
-        <pc:graphicFrameChg chg="modGraphic">
-          <ac:chgData name="Gerth Stølting Brodal" userId="04ef4784-6591-4f86-a140-f5c3b108582a" providerId="ADAL" clId="{0503BB6B-FBF1-446E-8B69-27FAE64E3F3E}" dt="2024-03-03T19:56:06.701" v="6" actId="14734"/>
-          <ac:graphicFrameMkLst>
-            <pc:docMk/>
-            <pc:sldMk cId="3634352186" sldId="619"/>
-            <ac:graphicFrameMk id="4" creationId="{00000000-0000-0000-0000-000000000000}"/>
-          </ac:graphicFrameMkLst>
-        </pc:graphicFrameChg>
       </pc:sldChg>
       <pc:sldChg chg="modNotesTx">
         <pc:chgData name="Gerth Stølting Brodal" userId="04ef4784-6591-4f86-a140-f5c3b108582a" providerId="ADAL" clId="{0503BB6B-FBF1-446E-8B69-27FAE64E3F3E}" dt="2024-03-04T07:54:51.204" v="49" actId="20577"/>
@@ -619,14 +401,6 @@
           <pc:docMk/>
           <pc:sldMk cId="3378995729" sldId="654"/>
         </pc:sldMkLst>
-        <pc:graphicFrameChg chg="modGraphic">
-          <ac:chgData name="Gerth Stølting Brodal" userId="04ef4784-6591-4f86-a140-f5c3b108582a" providerId="ADAL" clId="{0503BB6B-FBF1-446E-8B69-27FAE64E3F3E}" dt="2024-03-04T08:19:07.718" v="60" actId="6549"/>
-          <ac:graphicFrameMkLst>
-            <pc:docMk/>
-            <pc:sldMk cId="3378995729" sldId="654"/>
-            <ac:graphicFrameMk id="7" creationId="{00000000-0000-0000-0000-000000000000}"/>
-          </ac:graphicFrameMkLst>
-        </pc:graphicFrameChg>
       </pc:sldChg>
       <pc:sldChg chg="modSp mod">
         <pc:chgData name="Gerth Stølting Brodal" userId="04ef4784-6591-4f86-a140-f5c3b108582a" providerId="ADAL" clId="{0503BB6B-FBF1-446E-8B69-27FAE64E3F3E}" dt="2024-03-04T08:25:53.901" v="79" actId="20577"/>
@@ -634,22 +408,6 @@
           <pc:docMk/>
           <pc:sldMk cId="1185943605" sldId="657"/>
         </pc:sldMkLst>
-        <pc:spChg chg="mod">
-          <ac:chgData name="Gerth Stølting Brodal" userId="04ef4784-6591-4f86-a140-f5c3b108582a" providerId="ADAL" clId="{0503BB6B-FBF1-446E-8B69-27FAE64E3F3E}" dt="2024-03-04T08:24:52.787" v="71" actId="27636"/>
-          <ac:spMkLst>
-            <pc:docMk/>
-            <pc:sldMk cId="1185943605" sldId="657"/>
-            <ac:spMk id="3" creationId="{00000000-0000-0000-0000-000000000000}"/>
-          </ac:spMkLst>
-        </pc:spChg>
-        <pc:graphicFrameChg chg="modGraphic">
-          <ac:chgData name="Gerth Stølting Brodal" userId="04ef4784-6591-4f86-a140-f5c3b108582a" providerId="ADAL" clId="{0503BB6B-FBF1-446E-8B69-27FAE64E3F3E}" dt="2024-03-04T08:25:53.901" v="79" actId="20577"/>
-          <ac:graphicFrameMkLst>
-            <pc:docMk/>
-            <pc:sldMk cId="1185943605" sldId="657"/>
-            <ac:graphicFrameMk id="4" creationId="{00000000-0000-0000-0000-000000000000}"/>
-          </ac:graphicFrameMkLst>
-        </pc:graphicFrameChg>
       </pc:sldChg>
     </pc:docChg>
   </pc:docChgLst>
@@ -738,7 +496,7 @@
           <a:p>
             <a:fld id="{FB1A172F-81D4-4DC4-9113-1DBD56EC3646}" type="datetimeFigureOut">
               <a:rPr lang="en-US" smtClean="0"/>
-              <a:t>3/4/2024</a:t>
+              <a:t>3/3/2025</a:t>
             </a:fld>
             <a:endParaRPr lang="en-US"/>
           </a:p>
@@ -1643,6 +1401,118 @@
 </p:notes>
 </file>
 
+<file path=ppt/notesSlides/notesSlide15.xml><?xml version="1.0" encoding="utf-8"?>
+<p:notes xmlns:a="http://schemas.openxmlformats.org/drawingml/2006/main" xmlns:r="http://schemas.openxmlformats.org/officeDocument/2006/relationships" xmlns:p="http://schemas.openxmlformats.org/presentationml/2006/main">
+  <p:cSld>
+    <p:spTree>
+      <p:nvGrpSpPr>
+        <p:cNvPr id="1" name=""/>
+        <p:cNvGrpSpPr/>
+        <p:nvPr/>
+      </p:nvGrpSpPr>
+      <p:grpSpPr>
+        <a:xfrm>
+          <a:off x="0" y="0"/>
+          <a:ext cx="0" cy="0"/>
+          <a:chOff x="0" y="0"/>
+          <a:chExt cx="0" cy="0"/>
+        </a:xfrm>
+      </p:grpSpPr>
+      <p:sp>
+        <p:nvSpPr>
+          <p:cNvPr id="2" name="Slide Image Placeholder 1"/>
+          <p:cNvSpPr>
+            <a:spLocks noGrp="1" noRot="1" noChangeAspect="1"/>
+          </p:cNvSpPr>
+          <p:nvPr>
+            <p:ph type="sldImg"/>
+          </p:nvPr>
+        </p:nvSpPr>
+        <p:spPr/>
+      </p:sp>
+      <p:sp>
+        <p:nvSpPr>
+          <p:cNvPr id="3" name="Notes Placeholder 2"/>
+          <p:cNvSpPr>
+            <a:spLocks noGrp="1"/>
+          </p:cNvSpPr>
+          <p:nvPr>
+            <p:ph type="body" idx="1"/>
+          </p:nvPr>
+        </p:nvSpPr>
+        <p:spPr/>
+        <p:txBody>
+          <a:bodyPr/>
+          <a:lstStyle/>
+          <a:p>
+            <a:r>
+              <a:rPr lang="da-DK" dirty="0"/>
+              <a:t>Default hash(</a:t>
+            </a:r>
+            <a:r>
+              <a:rPr lang="da-DK" dirty="0" err="1"/>
+              <a:t>object</a:t>
+            </a:r>
+            <a:r>
+              <a:rPr lang="da-DK" dirty="0"/>
+              <a:t>) = </a:t>
+            </a:r>
+            <a:r>
+              <a:rPr lang="da-DK" dirty="0" err="1"/>
+              <a:t>memory</a:t>
+            </a:r>
+            <a:r>
+              <a:rPr lang="da-DK" dirty="0"/>
+              <a:t> </a:t>
+            </a:r>
+            <a:r>
+              <a:rPr lang="da-DK" dirty="0" err="1"/>
+              <a:t>address</a:t>
+            </a:r>
+            <a:r>
+              <a:rPr lang="da-DK" dirty="0"/>
+              <a:t> // 16</a:t>
+            </a:r>
+            <a:endParaRPr lang="en-US" dirty="0"/>
+          </a:p>
+        </p:txBody>
+      </p:sp>
+      <p:sp>
+        <p:nvSpPr>
+          <p:cNvPr id="4" name="Slide Number Placeholder 3"/>
+          <p:cNvSpPr>
+            <a:spLocks noGrp="1"/>
+          </p:cNvSpPr>
+          <p:nvPr>
+            <p:ph type="sldNum" sz="quarter" idx="5"/>
+          </p:nvPr>
+        </p:nvSpPr>
+        <p:spPr/>
+        <p:txBody>
+          <a:bodyPr/>
+          <a:lstStyle/>
+          <a:p>
+            <a:fld id="{CD563DD8-32AB-41BE-B1C6-8EAC45222ACE}" type="slidenum">
+              <a:rPr lang="en-US" smtClean="0"/>
+              <a:t>29</a:t>
+            </a:fld>
+            <a:endParaRPr lang="en-US"/>
+          </a:p>
+        </p:txBody>
+      </p:sp>
+    </p:spTree>
+    <p:extLst>
+      <p:ext uri="{BB962C8B-B14F-4D97-AF65-F5344CB8AC3E}">
+        <p14:creationId xmlns:p14="http://schemas.microsoft.com/office/powerpoint/2010/main" val="3412146603"/>
+      </p:ext>
+    </p:extLst>
+  </p:cSld>
+  <p:clrMapOvr>
+    <a:masterClrMapping/>
+  </p:clrMapOvr>
+</p:notes>
+</file>
+
 <file path=ppt/notesSlides/notesSlide2.xml><?xml version="1.0" encoding="utf-8"?>
 <p:notes xmlns:a="http://schemas.openxmlformats.org/drawingml/2006/main" xmlns:r="http://schemas.openxmlformats.org/officeDocument/2006/relationships" xmlns:p="http://schemas.openxmlformats.org/presentationml/2006/main">
   <p:cSld>
@@ -2696,7 +2566,7 @@
           <a:p>
             <a:fld id="{0560A9CD-0304-4E0B-9E82-E7E0115DE05B}" type="datetimeFigureOut">
               <a:rPr lang="en-US" smtClean="0"/>
-              <a:t>3/4/2024</a:t>
+              <a:t>3/3/2025</a:t>
             </a:fld>
             <a:endParaRPr lang="en-US"/>
           </a:p>
@@ -2864,7 +2734,7 @@
           <a:p>
             <a:fld id="{0560A9CD-0304-4E0B-9E82-E7E0115DE05B}" type="datetimeFigureOut">
               <a:rPr lang="en-US" smtClean="0"/>
-              <a:t>3/4/2024</a:t>
+              <a:t>3/3/2025</a:t>
             </a:fld>
             <a:endParaRPr lang="en-US"/>
           </a:p>
@@ -3042,7 +2912,7 @@
           <a:p>
             <a:fld id="{0560A9CD-0304-4E0B-9E82-E7E0115DE05B}" type="datetimeFigureOut">
               <a:rPr lang="en-US" smtClean="0"/>
-              <a:t>3/4/2024</a:t>
+              <a:t>3/3/2025</a:t>
             </a:fld>
             <a:endParaRPr lang="en-US"/>
           </a:p>
@@ -3225,7 +3095,7 @@
           <a:p>
             <a:fld id="{0560A9CD-0304-4E0B-9E82-E7E0115DE05B}" type="datetimeFigureOut">
               <a:rPr lang="en-US" smtClean="0"/>
-              <a:t>3/4/2024</a:t>
+              <a:t>3/3/2025</a:t>
             </a:fld>
             <a:endParaRPr lang="en-US"/>
           </a:p>
@@ -3470,7 +3340,7 @@
           <a:p>
             <a:fld id="{0560A9CD-0304-4E0B-9E82-E7E0115DE05B}" type="datetimeFigureOut">
               <a:rPr lang="en-US" smtClean="0"/>
-              <a:t>3/4/2024</a:t>
+              <a:t>3/3/2025</a:t>
             </a:fld>
             <a:endParaRPr lang="en-US"/>
           </a:p>
@@ -3699,7 +3569,7 @@
           <a:p>
             <a:fld id="{0560A9CD-0304-4E0B-9E82-E7E0115DE05B}" type="datetimeFigureOut">
               <a:rPr lang="en-US" smtClean="0"/>
-              <a:t>3/4/2024</a:t>
+              <a:t>3/3/2025</a:t>
             </a:fld>
             <a:endParaRPr lang="en-US"/>
           </a:p>
@@ -4063,7 +3933,7 @@
           <a:p>
             <a:fld id="{0560A9CD-0304-4E0B-9E82-E7E0115DE05B}" type="datetimeFigureOut">
               <a:rPr lang="en-US" smtClean="0"/>
-              <a:t>3/4/2024</a:t>
+              <a:t>3/3/2025</a:t>
             </a:fld>
             <a:endParaRPr lang="en-US"/>
           </a:p>
@@ -4180,7 +4050,7 @@
           <a:p>
             <a:fld id="{0560A9CD-0304-4E0B-9E82-E7E0115DE05B}" type="datetimeFigureOut">
               <a:rPr lang="en-US" smtClean="0"/>
-              <a:t>3/4/2024</a:t>
+              <a:t>3/3/2025</a:t>
             </a:fld>
             <a:endParaRPr lang="en-US"/>
           </a:p>
@@ -4275,7 +4145,7 @@
           <a:p>
             <a:fld id="{0560A9CD-0304-4E0B-9E82-E7E0115DE05B}" type="datetimeFigureOut">
               <a:rPr lang="en-US" smtClean="0"/>
-              <a:t>3/4/2024</a:t>
+              <a:t>3/3/2025</a:t>
             </a:fld>
             <a:endParaRPr lang="en-US"/>
           </a:p>
@@ -4550,7 +4420,7 @@
           <a:p>
             <a:fld id="{0560A9CD-0304-4E0B-9E82-E7E0115DE05B}" type="datetimeFigureOut">
               <a:rPr lang="en-US" smtClean="0"/>
-              <a:t>3/4/2024</a:t>
+              <a:t>3/3/2025</a:t>
             </a:fld>
             <a:endParaRPr lang="en-US"/>
           </a:p>
@@ -4802,7 +4672,7 @@
           <a:p>
             <a:fld id="{0560A9CD-0304-4E0B-9E82-E7E0115DE05B}" type="datetimeFigureOut">
               <a:rPr lang="en-US" smtClean="0"/>
-              <a:t>3/4/2024</a:t>
+              <a:t>3/3/2025</a:t>
             </a:fld>
             <a:endParaRPr lang="en-US"/>
           </a:p>
@@ -5013,7 +4883,7 @@
           <a:p>
             <a:fld id="{0560A9CD-0304-4E0B-9E82-E7E0115DE05B}" type="datetimeFigureOut">
               <a:rPr lang="en-US" smtClean="0"/>
-              <a:t>3/4/2024</a:t>
+              <a:t>3/3/2025</a:t>
             </a:fld>
             <a:endParaRPr lang="en-US"/>
           </a:p>
@@ -10796,8 +10666,8 @@
         </p:nvSpPr>
         <p:spPr>
           <a:xfrm>
-            <a:off x="838200" y="2155077"/>
-            <a:ext cx="4838325" cy="2169433"/>
+            <a:off x="915572" y="1690689"/>
+            <a:ext cx="8685628" cy="1488610"/>
           </a:xfrm>
         </p:spPr>
         <p:txBody>
@@ -10927,9 +10797,6 @@
               </a:rPr>
               <a:t>__</a:t>
             </a:r>
-            <a:endParaRPr lang="da-DK" sz="2400" dirty="0"/>
-          </a:p>
-          <a:p>
             <a:endParaRPr lang="da-DK" sz="2400" dirty="0"/>
           </a:p>
           <a:p>
@@ -10997,14 +10864,14 @@
           <p:nvPr>
             <p:extLst>
               <p:ext uri="{D42A27DB-BD31-4B8C-83A1-F6EECF244321}">
-                <p14:modId xmlns:p14="http://schemas.microsoft.com/office/powerpoint/2010/main" val="1731543211"/>
+                <p14:modId xmlns:p14="http://schemas.microsoft.com/office/powerpoint/2010/main" val="3573044610"/>
               </p:ext>
             </p:extLst>
           </p:nvPr>
         </p:nvGraphicFramePr>
         <p:xfrm>
-          <a:off x="5807903" y="2155077"/>
-          <a:ext cx="5910580" cy="3657600"/>
+          <a:off x="1991703" y="3252357"/>
+          <a:ext cx="8208594" cy="3108960"/>
         </p:xfrm>
         <a:graphic>
           <a:graphicData uri="http://schemas.openxmlformats.org/drawingml/2006/table">
@@ -11013,7 +10880,7 @@
                 <a:tableStyleId>{5C22544A-7EE6-4342-B048-85BDC9FD1C3A}</a:tableStyleId>
               </a:tblPr>
               <a:tblGrid>
-                <a:gridCol w="5910580">
+                <a:gridCol w="8208594">
                   <a:extLst>
                     <a:ext uri="{9D8B030D-6E8A-4147-A177-3AD203B41FA5}">
                       <a16:colId xmlns:a16="http://schemas.microsoft.com/office/drawing/2014/main" val="1873682825"/>
@@ -11204,19 +11071,17 @@
                           <a:latin typeface="Courier New" panose="02070309020205020404" pitchFamily="49" charset="0"/>
                           <a:cs typeface="Courier New" panose="02070309020205020404" pitchFamily="49" charset="0"/>
                         </a:rPr>
-                        <a:t>        return ("Student('%s', '%s')"</a:t>
-                      </a:r>
-                    </a:p>
-                    <a:p>
-                      <a:r>
-                        <a:rPr lang="en-US" sz="1800" b="1" baseline="0" dirty="0">
+                        <a:t>         return </a:t>
+                      </a:r>
+                      <a:r>
+                        <a:rPr lang="en-US" sz="1800" b="1" dirty="0" err="1">
                           <a:solidFill>
                             <a:schemeClr val="tx1"/>
                           </a:solidFill>
                           <a:latin typeface="Courier New" panose="02070309020205020404" pitchFamily="49" charset="0"/>
                           <a:cs typeface="Courier New" panose="02070309020205020404" pitchFamily="49" charset="0"/>
                         </a:rPr>
-                        <a:t>              </a:t>
+                        <a:t>f"Student</a:t>
                       </a:r>
                       <a:r>
                         <a:rPr lang="en-US" sz="1800" b="1" dirty="0">
@@ -11226,17 +11091,8 @@
                           <a:latin typeface="Courier New" panose="02070309020205020404" pitchFamily="49" charset="0"/>
                           <a:cs typeface="Courier New" panose="02070309020205020404" pitchFamily="49" charset="0"/>
                         </a:rPr>
-                        <a:t>  % (self.name, self.id))</a:t>
-                      </a:r>
-                    </a:p>
-                    <a:p>
-                      <a:endParaRPr lang="en-US" sz="1800" b="1" dirty="0">
-                        <a:solidFill>
-                          <a:schemeClr val="tx1"/>
-                        </a:solidFill>
-                        <a:latin typeface="Courier New" panose="02070309020205020404" pitchFamily="49" charset="0"/>
-                        <a:cs typeface="Courier New" panose="02070309020205020404" pitchFamily="49" charset="0"/>
-                      </a:endParaRPr>
+                        <a:t>('{self.name}', '{self.id}')"</a:t>
+                      </a:r>
                     </a:p>
                     <a:p>
                       <a:r>
@@ -17224,11 +17080,7 @@
             </a:r>
             <a:r>
               <a:rPr lang="da-DK" sz="2400" dirty="0"/>
-              <a:t>, p. </a:t>
-            </a:r>
-            <a:r>
-              <a:rPr lang="da-DK" sz="2400"/>
-              <a:t>200] </a:t>
+              <a:t>, p. 200] </a:t>
             </a:r>
             <a:r>
               <a:rPr lang="da-DK" sz="2400" dirty="0" err="1"/>
@@ -30579,7 +30431,7 @@
           <a:p>
             <a:r>
               <a:rPr lang="en-US" dirty="0"/>
-              <a:t>Always decide whether a class's methods and instance variables (collectively: "attributes") should be </a:t>
+              <a:t>Always decide whether a class's methods and instance variables (collectively "attributes") should be </a:t>
             </a:r>
             <a:r>
               <a:rPr lang="en-US" dirty="0">
@@ -32112,7 +31964,7 @@
             </a:r>
             <a:r>
               <a:rPr lang="en-US" dirty="0">
-                <a:hlinkClick r:id="rId2"/>
+                <a:hlinkClick r:id="rId3"/>
               </a:rPr>
               <a:t>www.python-course.eu/python3_magic_methods.php</a:t>
             </a:r>

</xml_diff>

<commit_message>
all-slides.pdf classes.pdf classes.pptx hierarchies.pdf hierarchies.pptx
</commit_message>
<xml_diff>
--- a/ipsa/slides/classes.pptx
+++ b/ipsa/slides/classes.pptx
@@ -21,8 +21,8 @@
     <p:sldId id="674" r:id="rId12"/>
     <p:sldId id="654" r:id="rId13"/>
     <p:sldId id="645" r:id="rId14"/>
-    <p:sldId id="658" r:id="rId15"/>
-    <p:sldId id="659" r:id="rId16"/>
+    <p:sldId id="659" r:id="rId15"/>
+    <p:sldId id="658" r:id="rId16"/>
     <p:sldId id="657" r:id="rId17"/>
     <p:sldId id="655" r:id="rId18"/>
     <p:sldId id="661" r:id="rId19"/>
@@ -278,8 +278,8 @@
   </pc:docChgLst>
   <pc:docChgLst>
     <pc:chgData name="Gerth Stølting Brodal" userId="04ef4784-6591-4f86-a140-f5c3b108582a" providerId="ADAL" clId="{9D905D2A-7BDA-40BC-B748-BD3D6CCF9001}"/>
-    <pc:docChg chg="custSel modSld">
-      <pc:chgData name="Gerth Stølting Brodal" userId="04ef4784-6591-4f86-a140-f5c3b108582a" providerId="ADAL" clId="{9D905D2A-7BDA-40BC-B748-BD3D6CCF9001}" dt="2025-03-03T17:02:52.756" v="65" actId="1076"/>
+    <pc:docChg chg="custSel modSld sldOrd">
+      <pc:chgData name="Gerth Stølting Brodal" userId="04ef4784-6591-4f86-a140-f5c3b108582a" providerId="ADAL" clId="{9D905D2A-7BDA-40BC-B748-BD3D6CCF9001}" dt="2025-03-05T07:21:06.954" v="69" actId="20577"/>
       <pc:docMkLst>
         <pc:docMk/>
       </pc:docMkLst>
@@ -291,13 +291,13 @@
         </pc:sldMkLst>
       </pc:sldChg>
       <pc:sldChg chg="modSp mod">
-        <pc:chgData name="Gerth Stølting Brodal" userId="04ef4784-6591-4f86-a140-f5c3b108582a" providerId="ADAL" clId="{9D905D2A-7BDA-40BC-B748-BD3D6CCF9001}" dt="2025-03-03T08:47:54.772" v="0" actId="20577"/>
+        <pc:chgData name="Gerth Stølting Brodal" userId="04ef4784-6591-4f86-a140-f5c3b108582a" providerId="ADAL" clId="{9D905D2A-7BDA-40BC-B748-BD3D6CCF9001}" dt="2025-03-05T07:21:06.954" v="69" actId="20577"/>
         <pc:sldMkLst>
           <pc:docMk/>
           <pc:sldMk cId="860418074" sldId="639"/>
         </pc:sldMkLst>
         <pc:spChg chg="mod">
-          <ac:chgData name="Gerth Stølting Brodal" userId="04ef4784-6591-4f86-a140-f5c3b108582a" providerId="ADAL" clId="{9D905D2A-7BDA-40BC-B748-BD3D6CCF9001}" dt="2025-03-03T08:47:54.772" v="0" actId="20577"/>
+          <ac:chgData name="Gerth Stølting Brodal" userId="04ef4784-6591-4f86-a140-f5c3b108582a" providerId="ADAL" clId="{9D905D2A-7BDA-40BC-B748-BD3D6CCF9001}" dt="2025-03-05T07:21:06.954" v="69" actId="20577"/>
           <ac:spMkLst>
             <pc:docMk/>
             <pc:sldMk cId="860418074" sldId="639"/>
@@ -305,8 +305,8 @@
           </ac:spMkLst>
         </pc:spChg>
       </pc:sldChg>
-      <pc:sldChg chg="modSp mod">
-        <pc:chgData name="Gerth Stølting Brodal" userId="04ef4784-6591-4f86-a140-f5c3b108582a" providerId="ADAL" clId="{9D905D2A-7BDA-40BC-B748-BD3D6CCF9001}" dt="2025-03-03T17:02:52.756" v="65" actId="1076"/>
+      <pc:sldChg chg="modSp mod ord">
+        <pc:chgData name="Gerth Stølting Brodal" userId="04ef4784-6591-4f86-a140-f5c3b108582a" providerId="ADAL" clId="{9D905D2A-7BDA-40BC-B748-BD3D6CCF9001}" dt="2025-03-05T07:02:05.937" v="68"/>
         <pc:sldMkLst>
           <pc:docMk/>
           <pc:sldMk cId="1240346704" sldId="659"/>
@@ -496,7 +496,7 @@
           <a:p>
             <a:fld id="{FB1A172F-81D4-4DC4-9113-1DBD56EC3646}" type="datetimeFigureOut">
               <a:rPr lang="en-US" smtClean="0"/>
-              <a:t>3/3/2025</a:t>
+              <a:t>3/5/2025</a:t>
             </a:fld>
             <a:endParaRPr lang="en-US"/>
           </a:p>
@@ -2566,7 +2566,7 @@
           <a:p>
             <a:fld id="{0560A9CD-0304-4E0B-9E82-E7E0115DE05B}" type="datetimeFigureOut">
               <a:rPr lang="en-US" smtClean="0"/>
-              <a:t>3/3/2025</a:t>
+              <a:t>3/5/2025</a:t>
             </a:fld>
             <a:endParaRPr lang="en-US"/>
           </a:p>
@@ -2734,7 +2734,7 @@
           <a:p>
             <a:fld id="{0560A9CD-0304-4E0B-9E82-E7E0115DE05B}" type="datetimeFigureOut">
               <a:rPr lang="en-US" smtClean="0"/>
-              <a:t>3/3/2025</a:t>
+              <a:t>3/5/2025</a:t>
             </a:fld>
             <a:endParaRPr lang="en-US"/>
           </a:p>
@@ -2912,7 +2912,7 @@
           <a:p>
             <a:fld id="{0560A9CD-0304-4E0B-9E82-E7E0115DE05B}" type="datetimeFigureOut">
               <a:rPr lang="en-US" smtClean="0"/>
-              <a:t>3/3/2025</a:t>
+              <a:t>3/5/2025</a:t>
             </a:fld>
             <a:endParaRPr lang="en-US"/>
           </a:p>
@@ -3095,7 +3095,7 @@
           <a:p>
             <a:fld id="{0560A9CD-0304-4E0B-9E82-E7E0115DE05B}" type="datetimeFigureOut">
               <a:rPr lang="en-US" smtClean="0"/>
-              <a:t>3/3/2025</a:t>
+              <a:t>3/5/2025</a:t>
             </a:fld>
             <a:endParaRPr lang="en-US"/>
           </a:p>
@@ -3340,7 +3340,7 @@
           <a:p>
             <a:fld id="{0560A9CD-0304-4E0B-9E82-E7E0115DE05B}" type="datetimeFigureOut">
               <a:rPr lang="en-US" smtClean="0"/>
-              <a:t>3/3/2025</a:t>
+              <a:t>3/5/2025</a:t>
             </a:fld>
             <a:endParaRPr lang="en-US"/>
           </a:p>
@@ -3569,7 +3569,7 @@
           <a:p>
             <a:fld id="{0560A9CD-0304-4E0B-9E82-E7E0115DE05B}" type="datetimeFigureOut">
               <a:rPr lang="en-US" smtClean="0"/>
-              <a:t>3/3/2025</a:t>
+              <a:t>3/5/2025</a:t>
             </a:fld>
             <a:endParaRPr lang="en-US"/>
           </a:p>
@@ -3933,7 +3933,7 @@
           <a:p>
             <a:fld id="{0560A9CD-0304-4E0B-9E82-E7E0115DE05B}" type="datetimeFigureOut">
               <a:rPr lang="en-US" smtClean="0"/>
-              <a:t>3/3/2025</a:t>
+              <a:t>3/5/2025</a:t>
             </a:fld>
             <a:endParaRPr lang="en-US"/>
           </a:p>
@@ -4050,7 +4050,7 @@
           <a:p>
             <a:fld id="{0560A9CD-0304-4E0B-9E82-E7E0115DE05B}" type="datetimeFigureOut">
               <a:rPr lang="en-US" smtClean="0"/>
-              <a:t>3/3/2025</a:t>
+              <a:t>3/5/2025</a:t>
             </a:fld>
             <a:endParaRPr lang="en-US"/>
           </a:p>
@@ -4145,7 +4145,7 @@
           <a:p>
             <a:fld id="{0560A9CD-0304-4E0B-9E82-E7E0115DE05B}" type="datetimeFigureOut">
               <a:rPr lang="en-US" smtClean="0"/>
-              <a:t>3/3/2025</a:t>
+              <a:t>3/5/2025</a:t>
             </a:fld>
             <a:endParaRPr lang="en-US"/>
           </a:p>
@@ -4420,7 +4420,7 @@
           <a:p>
             <a:fld id="{0560A9CD-0304-4E0B-9E82-E7E0115DE05B}" type="datetimeFigureOut">
               <a:rPr lang="en-US" smtClean="0"/>
-              <a:t>3/3/2025</a:t>
+              <a:t>3/5/2025</a:t>
             </a:fld>
             <a:endParaRPr lang="en-US"/>
           </a:p>
@@ -4672,7 +4672,7 @@
           <a:p>
             <a:fld id="{0560A9CD-0304-4E0B-9E82-E7E0115DE05B}" type="datetimeFigureOut">
               <a:rPr lang="en-US" smtClean="0"/>
-              <a:t>3/3/2025</a:t>
+              <a:t>3/5/2025</a:t>
             </a:fld>
             <a:endParaRPr lang="en-US"/>
           </a:p>
@@ -4883,7 +4883,7 @@
           <a:p>
             <a:fld id="{0560A9CD-0304-4E0B-9E82-E7E0115DE05B}" type="datetimeFigureOut">
               <a:rPr lang="en-US" smtClean="0"/>
-              <a:t>3/3/2025</a:t>
+              <a:t>3/5/2025</a:t>
             </a:fld>
             <a:endParaRPr lang="en-US"/>
           </a:p>
@@ -9682,949 +9682,6 @@
           <a:p>
             <a:r>
               <a:rPr lang="da-DK" dirty="0" err="1"/>
-              <a:t>Defining</a:t>
-            </a:r>
-            <a:r>
-              <a:rPr lang="da-DK" dirty="0"/>
-              <a:t> </a:t>
-            </a:r>
-            <a:r>
-              <a:rPr lang="da-DK" dirty="0" err="1"/>
-              <a:t>order</a:t>
-            </a:r>
-            <a:r>
-              <a:rPr lang="da-DK" dirty="0"/>
-              <a:t> on </a:t>
-            </a:r>
-            <a:r>
-              <a:rPr lang="da-DK" dirty="0" err="1"/>
-              <a:t>instances</a:t>
-            </a:r>
-            <a:r>
-              <a:rPr lang="da-DK" dirty="0"/>
-              <a:t> of a </a:t>
-            </a:r>
-            <a:r>
-              <a:rPr lang="da-DK" dirty="0" err="1"/>
-              <a:t>class</a:t>
-            </a:r>
-            <a:r>
-              <a:rPr lang="da-DK" dirty="0"/>
-              <a:t> (</a:t>
-            </a:r>
-            <a:r>
-              <a:rPr lang="da-DK" dirty="0" err="1"/>
-              <a:t>sorting</a:t>
-            </a:r>
-            <a:r>
-              <a:rPr lang="da-DK" dirty="0"/>
-              <a:t>)</a:t>
-            </a:r>
-            <a:endParaRPr lang="en-US" dirty="0"/>
-          </a:p>
-        </p:txBody>
-      </p:sp>
-      <p:sp>
-        <p:nvSpPr>
-          <p:cNvPr id="3" name="Content Placeholder 2"/>
-          <p:cNvSpPr>
-            <a:spLocks noGrp="1"/>
-          </p:cNvSpPr>
-          <p:nvPr>
-            <p:ph idx="1"/>
-          </p:nvPr>
-        </p:nvSpPr>
-        <p:spPr>
-          <a:xfrm>
-            <a:off x="609601" y="2309654"/>
-            <a:ext cx="5192487" cy="2931432"/>
-          </a:xfrm>
-        </p:spPr>
-        <p:txBody>
-          <a:bodyPr>
-            <a:normAutofit/>
-          </a:bodyPr>
-          <a:lstStyle/>
-          <a:p>
-            <a:r>
-              <a:rPr lang="da-DK" sz="2400" dirty="0"/>
-              <a:t>To </a:t>
-            </a:r>
-            <a:r>
-              <a:rPr lang="da-DK" sz="2400" dirty="0" err="1"/>
-              <a:t>define</a:t>
-            </a:r>
-            <a:r>
-              <a:rPr lang="da-DK" sz="2400" dirty="0"/>
-              <a:t> an </a:t>
-            </a:r>
-            <a:r>
-              <a:rPr lang="da-DK" sz="2400" dirty="0" err="1"/>
-              <a:t>order</a:t>
-            </a:r>
-            <a:r>
-              <a:rPr lang="da-DK" sz="2400" dirty="0"/>
-              <a:t> on </a:t>
-            </a:r>
-            <a:r>
-              <a:rPr lang="da-DK" sz="2400" dirty="0" err="1"/>
-              <a:t>objects</a:t>
-            </a:r>
-            <a:r>
-              <a:rPr lang="da-DK" sz="2400" dirty="0"/>
-              <a:t>,</a:t>
-            </a:r>
-            <a:r>
-              <a:rPr lang="en-US" sz="2400" dirty="0"/>
-              <a:t> define the “&lt;“ operator by defining </a:t>
-            </a:r>
-            <a:r>
-              <a:rPr lang="en-US" sz="2400" dirty="0">
-                <a:latin typeface="Courier New" panose="02070309020205020404" pitchFamily="49" charset="0"/>
-                <a:cs typeface="Courier New" panose="02070309020205020404" pitchFamily="49" charset="0"/>
-              </a:rPr>
-              <a:t>__</a:t>
-            </a:r>
-            <a:r>
-              <a:rPr lang="en-US" sz="2400" dirty="0" err="1">
-                <a:latin typeface="Courier New" panose="02070309020205020404" pitchFamily="49" charset="0"/>
-                <a:cs typeface="Courier New" panose="02070309020205020404" pitchFamily="49" charset="0"/>
-              </a:rPr>
-              <a:t>lt</a:t>
-            </a:r>
-            <a:r>
-              <a:rPr lang="en-US" sz="2400" dirty="0">
-                <a:latin typeface="Courier New" panose="02070309020205020404" pitchFamily="49" charset="0"/>
-                <a:cs typeface="Courier New" panose="02070309020205020404" pitchFamily="49" charset="0"/>
-              </a:rPr>
-              <a:t>__</a:t>
-            </a:r>
-          </a:p>
-          <a:p>
-            <a:endParaRPr lang="da-DK" sz="2400" dirty="0">
-              <a:latin typeface="Courier New" panose="02070309020205020404" pitchFamily="49" charset="0"/>
-              <a:cs typeface="Courier New" panose="02070309020205020404" pitchFamily="49" charset="0"/>
-            </a:endParaRPr>
-          </a:p>
-          <a:p>
-            <a:r>
-              <a:rPr lang="da-DK" sz="2400" dirty="0" err="1"/>
-              <a:t>When</a:t>
-            </a:r>
-            <a:r>
-              <a:rPr lang="da-DK" sz="2400" dirty="0"/>
-              <a:t> ”</a:t>
-            </a:r>
-            <a:r>
-              <a:rPr lang="da-DK" sz="2400" dirty="0">
-                <a:latin typeface="Courier New" panose="02070309020205020404" pitchFamily="49" charset="0"/>
-                <a:cs typeface="Courier New" panose="02070309020205020404" pitchFamily="49" charset="0"/>
-              </a:rPr>
-              <a:t>&lt;</a:t>
-            </a:r>
-            <a:r>
-              <a:rPr lang="da-DK" sz="2400" dirty="0"/>
-              <a:t>” is </a:t>
-            </a:r>
-            <a:r>
-              <a:rPr lang="da-DK" sz="2400" dirty="0" err="1"/>
-              <a:t>defined</a:t>
-            </a:r>
-            <a:r>
-              <a:rPr lang="da-DK" sz="2400" dirty="0"/>
-              <a:t> a list </a:t>
-            </a:r>
-            <a:r>
-              <a:rPr lang="da-DK" sz="2400" dirty="0">
-                <a:latin typeface="Courier New" panose="02070309020205020404" pitchFamily="49" charset="0"/>
-                <a:cs typeface="Courier New" panose="02070309020205020404" pitchFamily="49" charset="0"/>
-              </a:rPr>
-              <a:t>L</a:t>
-            </a:r>
-            <a:r>
-              <a:rPr lang="da-DK" sz="2400" dirty="0"/>
-              <a:t> of students </a:t>
-            </a:r>
-            <a:r>
-              <a:rPr lang="da-DK" sz="2400" dirty="0" err="1"/>
-              <a:t>can</a:t>
-            </a:r>
-            <a:r>
-              <a:rPr lang="da-DK" sz="2400" dirty="0"/>
-              <a:t> </a:t>
-            </a:r>
-            <a:r>
-              <a:rPr lang="da-DK" sz="2400" dirty="0" err="1"/>
-              <a:t>be</a:t>
-            </a:r>
-            <a:r>
-              <a:rPr lang="da-DK" sz="2400" dirty="0"/>
-              <a:t> </a:t>
-            </a:r>
-            <a:r>
-              <a:rPr lang="da-DK" sz="2400" dirty="0" err="1"/>
-              <a:t>sorted</a:t>
-            </a:r>
-            <a:r>
-              <a:rPr lang="da-DK" sz="2400" dirty="0"/>
-              <a:t> </a:t>
-            </a:r>
-            <a:r>
-              <a:rPr lang="da-DK" sz="2400" dirty="0" err="1"/>
-              <a:t>using</a:t>
-            </a:r>
-            <a:r>
-              <a:rPr lang="da-DK" sz="2400" dirty="0"/>
-              <a:t> </a:t>
-            </a:r>
-            <a:r>
-              <a:rPr lang="da-DK" sz="2400" dirty="0" err="1">
-                <a:latin typeface="Courier New" panose="02070309020205020404" pitchFamily="49" charset="0"/>
-                <a:cs typeface="Courier New" panose="02070309020205020404" pitchFamily="49" charset="0"/>
-              </a:rPr>
-              <a:t>sorted</a:t>
-            </a:r>
-            <a:r>
-              <a:rPr lang="da-DK" sz="2400" dirty="0">
-                <a:latin typeface="Courier New" panose="02070309020205020404" pitchFamily="49" charset="0"/>
-                <a:cs typeface="Courier New" panose="02070309020205020404" pitchFamily="49" charset="0"/>
-              </a:rPr>
-              <a:t>(L)</a:t>
-            </a:r>
-            <a:r>
-              <a:rPr lang="da-DK" sz="2400" dirty="0"/>
-              <a:t> and </a:t>
-            </a:r>
-            <a:r>
-              <a:rPr lang="da-DK" sz="2400" dirty="0" err="1">
-                <a:latin typeface="Courier New" panose="02070309020205020404" pitchFamily="49" charset="0"/>
-                <a:cs typeface="Courier New" panose="02070309020205020404" pitchFamily="49" charset="0"/>
-              </a:rPr>
-              <a:t>L.sort</a:t>
-            </a:r>
-            <a:r>
-              <a:rPr lang="da-DK" sz="2400" dirty="0">
-                <a:latin typeface="Courier New" panose="02070309020205020404" pitchFamily="49" charset="0"/>
-                <a:cs typeface="Courier New" panose="02070309020205020404" pitchFamily="49" charset="0"/>
-              </a:rPr>
-              <a:t>()</a:t>
-            </a:r>
-          </a:p>
-        </p:txBody>
-      </p:sp>
-      <p:graphicFrame>
-        <p:nvGraphicFramePr>
-          <p:cNvPr id="5" name="Table 4"/>
-          <p:cNvGraphicFramePr>
-            <a:graphicFrameLocks noGrp="1"/>
-          </p:cNvGraphicFramePr>
-          <p:nvPr>
-            <p:extLst>
-              <p:ext uri="{D42A27DB-BD31-4B8C-83A1-F6EECF244321}">
-                <p14:modId xmlns:p14="http://schemas.microsoft.com/office/powerpoint/2010/main" val="1969140147"/>
-              </p:ext>
-            </p:extLst>
-          </p:nvPr>
-        </p:nvGraphicFramePr>
-        <p:xfrm>
-          <a:off x="5992961" y="2309654"/>
-          <a:ext cx="5643880" cy="3931920"/>
-        </p:xfrm>
-        <a:graphic>
-          <a:graphicData uri="http://schemas.openxmlformats.org/drawingml/2006/table">
-            <a:tbl>
-              <a:tblPr firstRow="1" bandRow="1">
-                <a:tableStyleId>{5C22544A-7EE6-4342-B048-85BDC9FD1C3A}</a:tableStyleId>
-              </a:tblPr>
-              <a:tblGrid>
-                <a:gridCol w="5643880">
-                  <a:extLst>
-                    <a:ext uri="{9D8B030D-6E8A-4147-A177-3AD203B41FA5}">
-                      <a16:colId xmlns:a16="http://schemas.microsoft.com/office/drawing/2014/main" val="1873682825"/>
-                    </a:ext>
-                  </a:extLst>
-                </a:gridCol>
-              </a:tblGrid>
-              <a:tr h="148143">
-                <a:tc>
-                  <a:txBody>
-                    <a:bodyPr/>
-                    <a:lstStyle/>
-                    <a:p>
-                      <a:r>
-                        <a:rPr lang="da-DK" sz="1800" b="1" dirty="0">
-                          <a:latin typeface="Courier New" panose="02070309020205020404" pitchFamily="49" charset="0"/>
-                          <a:cs typeface="Courier New" panose="02070309020205020404" pitchFamily="49" charset="0"/>
-                        </a:rPr>
-                        <a:t>student.py</a:t>
-                      </a:r>
-                    </a:p>
-                  </a:txBody>
-                  <a:tcPr anchor="ctr">
-                    <a:lnL w="6350" cap="flat" cmpd="sng" algn="ctr">
-                      <a:solidFill>
-                        <a:schemeClr val="tx1"/>
-                      </a:solidFill>
-                      <a:prstDash val="solid"/>
-                      <a:round/>
-                      <a:headEnd type="none" w="med" len="med"/>
-                      <a:tailEnd type="none" w="med" len="med"/>
-                    </a:lnL>
-                    <a:lnR w="6350" cap="flat" cmpd="sng" algn="ctr">
-                      <a:solidFill>
-                        <a:schemeClr val="tx1"/>
-                      </a:solidFill>
-                      <a:prstDash val="solid"/>
-                      <a:round/>
-                      <a:headEnd type="none" w="med" len="med"/>
-                      <a:tailEnd type="none" w="med" len="med"/>
-                    </a:lnR>
-                    <a:lnT w="6350" cap="flat" cmpd="sng" algn="ctr">
-                      <a:solidFill>
-                        <a:schemeClr val="tx1"/>
-                      </a:solidFill>
-                      <a:prstDash val="solid"/>
-                      <a:round/>
-                      <a:headEnd type="none" w="med" len="med"/>
-                      <a:tailEnd type="none" w="med" len="med"/>
-                    </a:lnT>
-                    <a:lnB w="6350" cap="flat" cmpd="sng" algn="ctr">
-                      <a:solidFill>
-                        <a:schemeClr val="tx1"/>
-                      </a:solidFill>
-                      <a:prstDash val="solid"/>
-                      <a:round/>
-                      <a:headEnd type="none" w="med" len="med"/>
-                      <a:tailEnd type="none" w="med" len="med"/>
-                    </a:lnB>
-                    <a:lnTlToBr w="12700" cmpd="sng">
-                      <a:noFill/>
-                      <a:prstDash val="solid"/>
-                    </a:lnTlToBr>
-                    <a:lnBlToTr w="12700" cmpd="sng">
-                      <a:noFill/>
-                      <a:prstDash val="solid"/>
-                    </a:lnBlToTr>
-                    <a:solidFill>
-                      <a:srgbClr val="C00000"/>
-                    </a:solidFill>
-                  </a:tcPr>
-                </a:tc>
-                <a:extLst>
-                  <a:ext uri="{0D108BD9-81ED-4DB2-BD59-A6C34878D82A}">
-                    <a16:rowId xmlns:a16="http://schemas.microsoft.com/office/drawing/2014/main" val="3330819881"/>
-                  </a:ext>
-                </a:extLst>
-              </a:tr>
-              <a:tr h="297347">
-                <a:tc>
-                  <a:txBody>
-                    <a:bodyPr/>
-                    <a:lstStyle/>
-                    <a:p>
-                      <a:r>
-                        <a:rPr lang="en-US" sz="1800" b="1" dirty="0">
-                          <a:solidFill>
-                            <a:schemeClr val="accent1">
-                              <a:lumMod val="50000"/>
-                            </a:schemeClr>
-                          </a:solidFill>
-                          <a:latin typeface="Courier New" panose="02070309020205020404" pitchFamily="49" charset="0"/>
-                          <a:cs typeface="Courier New" panose="02070309020205020404" pitchFamily="49" charset="0"/>
-                        </a:rPr>
-                        <a:t>class</a:t>
-                      </a:r>
-                      <a:r>
-                        <a:rPr lang="en-US" sz="1800" b="1" dirty="0">
-                          <a:solidFill>
-                            <a:schemeClr val="tx1"/>
-                          </a:solidFill>
-                          <a:latin typeface="Courier New" panose="02070309020205020404" pitchFamily="49" charset="0"/>
-                          <a:cs typeface="Courier New" panose="02070309020205020404" pitchFamily="49" charset="0"/>
-                        </a:rPr>
-                        <a:t> Student:</a:t>
-                      </a:r>
-                    </a:p>
-                    <a:p>
-                      <a:r>
-                        <a:rPr lang="en-US" sz="1800" b="1" dirty="0">
-                          <a:solidFill>
-                            <a:schemeClr val="tx1"/>
-                          </a:solidFill>
-                          <a:latin typeface="Courier New" panose="02070309020205020404" pitchFamily="49" charset="0"/>
-                          <a:cs typeface="Courier New" panose="02070309020205020404" pitchFamily="49" charset="0"/>
-                        </a:rPr>
-                        <a:t>    </a:t>
-                      </a:r>
-                      <a:r>
-                        <a:rPr lang="en-US" sz="1800" b="1" dirty="0" err="1">
-                          <a:solidFill>
-                            <a:schemeClr val="accent1">
-                              <a:lumMod val="50000"/>
-                            </a:schemeClr>
-                          </a:solidFill>
-                          <a:latin typeface="Courier New" panose="02070309020205020404" pitchFamily="49" charset="0"/>
-                          <a:cs typeface="Courier New" panose="02070309020205020404" pitchFamily="49" charset="0"/>
-                        </a:rPr>
-                        <a:t>def</a:t>
-                      </a:r>
-                      <a:r>
-                        <a:rPr lang="en-US" sz="1800" b="1" dirty="0">
-                          <a:solidFill>
-                            <a:schemeClr val="tx1"/>
-                          </a:solidFill>
-                          <a:latin typeface="Courier New" panose="02070309020205020404" pitchFamily="49" charset="0"/>
-                          <a:cs typeface="Courier New" panose="02070309020205020404" pitchFamily="49" charset="0"/>
-                        </a:rPr>
-                        <a:t> </a:t>
-                      </a:r>
-                      <a:r>
-                        <a:rPr lang="en-US" sz="1800" b="1" dirty="0">
-                          <a:solidFill>
-                            <a:srgbClr val="C00000"/>
-                          </a:solidFill>
-                          <a:latin typeface="Courier New" panose="02070309020205020404" pitchFamily="49" charset="0"/>
-                          <a:cs typeface="Courier New" panose="02070309020205020404" pitchFamily="49" charset="0"/>
-                        </a:rPr>
-                        <a:t>__</a:t>
-                      </a:r>
-                      <a:r>
-                        <a:rPr lang="en-US" sz="1800" b="1" dirty="0" err="1">
-                          <a:solidFill>
-                            <a:srgbClr val="C00000"/>
-                          </a:solidFill>
-                          <a:latin typeface="Courier New" panose="02070309020205020404" pitchFamily="49" charset="0"/>
-                          <a:cs typeface="Courier New" panose="02070309020205020404" pitchFamily="49" charset="0"/>
-                        </a:rPr>
-                        <a:t>lt</a:t>
-                      </a:r>
-                      <a:r>
-                        <a:rPr lang="en-US" sz="1800" b="1" dirty="0">
-                          <a:solidFill>
-                            <a:srgbClr val="C00000"/>
-                          </a:solidFill>
-                          <a:latin typeface="Courier New" panose="02070309020205020404" pitchFamily="49" charset="0"/>
-                          <a:cs typeface="Courier New" panose="02070309020205020404" pitchFamily="49" charset="0"/>
-                        </a:rPr>
-                        <a:t>__</a:t>
-                      </a:r>
-                      <a:r>
-                        <a:rPr lang="en-US" sz="1800" b="1" dirty="0">
-                          <a:solidFill>
-                            <a:schemeClr val="tx1"/>
-                          </a:solidFill>
-                          <a:latin typeface="Courier New" panose="02070309020205020404" pitchFamily="49" charset="0"/>
-                          <a:cs typeface="Courier New" panose="02070309020205020404" pitchFamily="49" charset="0"/>
-                        </a:rPr>
-                        <a:t>(self, other):</a:t>
-                      </a:r>
-                    </a:p>
-                    <a:p>
-                      <a:r>
-                        <a:rPr lang="en-US" sz="1800" b="1" dirty="0">
-                          <a:solidFill>
-                            <a:schemeClr val="tx1"/>
-                          </a:solidFill>
-                          <a:latin typeface="Courier New" panose="02070309020205020404" pitchFamily="49" charset="0"/>
-                          <a:cs typeface="Courier New" panose="02070309020205020404" pitchFamily="49" charset="0"/>
-                        </a:rPr>
-                        <a:t>        return self.id &lt; other.id</a:t>
-                      </a:r>
-                    </a:p>
-                    <a:p>
-                      <a:endParaRPr lang="en-US" sz="1800" b="1" dirty="0">
-                        <a:solidFill>
-                          <a:schemeClr val="tx1"/>
-                        </a:solidFill>
-                        <a:latin typeface="Courier New" panose="02070309020205020404" pitchFamily="49" charset="0"/>
-                        <a:cs typeface="Courier New" panose="02070309020205020404" pitchFamily="49" charset="0"/>
-                      </a:endParaRPr>
-                    </a:p>
-                    <a:p>
-                      <a:r>
-                        <a:rPr lang="en-US" sz="1800" b="1" dirty="0">
-                          <a:solidFill>
-                            <a:schemeClr val="tx1"/>
-                          </a:solidFill>
-                          <a:latin typeface="Courier New" panose="02070309020205020404" pitchFamily="49" charset="0"/>
-                          <a:cs typeface="Courier New" panose="02070309020205020404" pitchFamily="49" charset="0"/>
-                        </a:rPr>
-                        <a:t>    ... </a:t>
-                      </a:r>
-                      <a:r>
-                        <a:rPr lang="en-US" sz="1800" b="1" dirty="0">
-                          <a:solidFill>
-                            <a:schemeClr val="bg1">
-                              <a:lumMod val="50000"/>
-                            </a:schemeClr>
-                          </a:solidFill>
-                          <a:latin typeface="Courier New" panose="02070309020205020404" pitchFamily="49" charset="0"/>
-                          <a:cs typeface="Courier New" panose="02070309020205020404" pitchFamily="49" charset="0"/>
-                        </a:rPr>
-                        <a:t>previous method definitions ...</a:t>
-                      </a:r>
-                      <a:endParaRPr lang="pt-BR" sz="1800" b="1" dirty="0">
-                        <a:solidFill>
-                          <a:schemeClr val="bg1">
-                            <a:lumMod val="50000"/>
-                          </a:schemeClr>
-                        </a:solidFill>
-                        <a:latin typeface="Courier New" panose="02070309020205020404" pitchFamily="49" charset="0"/>
-                        <a:cs typeface="Courier New" panose="02070309020205020404" pitchFamily="49" charset="0"/>
-                      </a:endParaRPr>
-                    </a:p>
-                  </a:txBody>
-                  <a:tcPr>
-                    <a:lnL w="6350" cap="flat" cmpd="sng" algn="ctr">
-                      <a:solidFill>
-                        <a:schemeClr val="tx1"/>
-                      </a:solidFill>
-                      <a:prstDash val="solid"/>
-                      <a:round/>
-                      <a:headEnd type="none" w="med" len="med"/>
-                      <a:tailEnd type="none" w="med" len="med"/>
-                    </a:lnL>
-                    <a:lnR w="6350" cap="flat" cmpd="sng" algn="ctr">
-                      <a:solidFill>
-                        <a:schemeClr val="tx1"/>
-                      </a:solidFill>
-                      <a:prstDash val="solid"/>
-                      <a:round/>
-                      <a:headEnd type="none" w="med" len="med"/>
-                      <a:tailEnd type="none" w="med" len="med"/>
-                    </a:lnR>
-                    <a:lnT w="6350" cap="flat" cmpd="sng" algn="ctr">
-                      <a:solidFill>
-                        <a:schemeClr val="tx1"/>
-                      </a:solidFill>
-                      <a:prstDash val="solid"/>
-                      <a:round/>
-                      <a:headEnd type="none" w="med" len="med"/>
-                      <a:tailEnd type="none" w="med" len="med"/>
-                    </a:lnT>
-                    <a:lnB w="6350" cap="flat" cmpd="sng" algn="ctr">
-                      <a:solidFill>
-                        <a:schemeClr val="tx1"/>
-                      </a:solidFill>
-                      <a:prstDash val="solid"/>
-                      <a:round/>
-                      <a:headEnd type="none" w="med" len="med"/>
-                      <a:tailEnd type="none" w="med" len="med"/>
-                    </a:lnB>
-                    <a:lnTlToBr w="12700" cmpd="sng">
-                      <a:noFill/>
-                      <a:prstDash val="solid"/>
-                    </a:lnTlToBr>
-                    <a:lnBlToTr w="12700" cmpd="sng">
-                      <a:noFill/>
-                      <a:prstDash val="solid"/>
-                    </a:lnBlToTr>
-                    <a:solidFill>
-                      <a:schemeClr val="accent5">
-                        <a:lumMod val="20000"/>
-                        <a:lumOff val="80000"/>
-                      </a:schemeClr>
-                    </a:solidFill>
-                  </a:tcPr>
-                </a:tc>
-                <a:extLst>
-                  <a:ext uri="{0D108BD9-81ED-4DB2-BD59-A6C34878D82A}">
-                    <a16:rowId xmlns:a16="http://schemas.microsoft.com/office/drawing/2014/main" val="4112970457"/>
-                  </a:ext>
-                </a:extLst>
-              </a:tr>
-              <a:tr h="148143">
-                <a:tc>
-                  <a:txBody>
-                    <a:bodyPr/>
-                    <a:lstStyle/>
-                    <a:p>
-                      <a:r>
-                        <a:rPr lang="da-DK" sz="1800" b="1" dirty="0" err="1">
-                          <a:solidFill>
-                            <a:schemeClr val="bg1"/>
-                          </a:solidFill>
-                          <a:latin typeface="Courier New" panose="02070309020205020404" pitchFamily="49" charset="0"/>
-                          <a:cs typeface="Courier New" panose="02070309020205020404" pitchFamily="49" charset="0"/>
-                        </a:rPr>
-                        <a:t>Python</a:t>
-                      </a:r>
-                      <a:r>
-                        <a:rPr lang="da-DK" sz="1800" b="1" dirty="0">
-                          <a:solidFill>
-                            <a:schemeClr val="bg1"/>
-                          </a:solidFill>
-                          <a:latin typeface="Courier New" panose="02070309020205020404" pitchFamily="49" charset="0"/>
-                          <a:cs typeface="Courier New" panose="02070309020205020404" pitchFamily="49" charset="0"/>
-                        </a:rPr>
-                        <a:t> </a:t>
-                      </a:r>
-                      <a:r>
-                        <a:rPr lang="da-DK" sz="1800" b="1" dirty="0" err="1">
-                          <a:solidFill>
-                            <a:schemeClr val="bg1"/>
-                          </a:solidFill>
-                          <a:latin typeface="Courier New" panose="02070309020205020404" pitchFamily="49" charset="0"/>
-                          <a:cs typeface="Courier New" panose="02070309020205020404" pitchFamily="49" charset="0"/>
-                        </a:rPr>
-                        <a:t>shell</a:t>
-                      </a:r>
-                      <a:endParaRPr lang="da-DK" sz="1800" b="1" dirty="0">
-                        <a:solidFill>
-                          <a:schemeClr val="bg1"/>
-                        </a:solidFill>
-                        <a:latin typeface="Courier New" panose="02070309020205020404" pitchFamily="49" charset="0"/>
-                        <a:cs typeface="Courier New" panose="02070309020205020404" pitchFamily="49" charset="0"/>
-                      </a:endParaRPr>
-                    </a:p>
-                  </a:txBody>
-                  <a:tcPr>
-                    <a:lnL w="6350" cap="flat" cmpd="sng" algn="ctr">
-                      <a:solidFill>
-                        <a:schemeClr val="tx1"/>
-                      </a:solidFill>
-                      <a:prstDash val="solid"/>
-                      <a:round/>
-                      <a:headEnd type="none" w="med" len="med"/>
-                      <a:tailEnd type="none" w="med" len="med"/>
-                    </a:lnL>
-                    <a:lnR w="6350" cap="flat" cmpd="sng" algn="ctr">
-                      <a:solidFill>
-                        <a:schemeClr val="tx1"/>
-                      </a:solidFill>
-                      <a:prstDash val="solid"/>
-                      <a:round/>
-                      <a:headEnd type="none" w="med" len="med"/>
-                      <a:tailEnd type="none" w="med" len="med"/>
-                    </a:lnR>
-                    <a:lnT w="6350" cap="flat" cmpd="sng" algn="ctr">
-                      <a:solidFill>
-                        <a:schemeClr val="tx1"/>
-                      </a:solidFill>
-                      <a:prstDash val="solid"/>
-                      <a:round/>
-                      <a:headEnd type="none" w="med" len="med"/>
-                      <a:tailEnd type="none" w="med" len="med"/>
-                    </a:lnT>
-                    <a:lnB w="6350" cap="flat" cmpd="sng" algn="ctr">
-                      <a:solidFill>
-                        <a:schemeClr val="tx1"/>
-                      </a:solidFill>
-                      <a:prstDash val="solid"/>
-                      <a:round/>
-                      <a:headEnd type="none" w="med" len="med"/>
-                      <a:tailEnd type="none" w="med" len="med"/>
-                    </a:lnB>
-                    <a:lnTlToBr w="12700" cmpd="sng">
-                      <a:noFill/>
-                      <a:prstDash val="solid"/>
-                    </a:lnTlToBr>
-                    <a:lnBlToTr w="12700" cmpd="sng">
-                      <a:noFill/>
-                      <a:prstDash val="solid"/>
-                    </a:lnBlToTr>
-                    <a:solidFill>
-                      <a:srgbClr val="C00000"/>
-                    </a:solidFill>
-                  </a:tcPr>
-                </a:tc>
-                <a:extLst>
-                  <a:ext uri="{0D108BD9-81ED-4DB2-BD59-A6C34878D82A}">
-                    <a16:rowId xmlns:a16="http://schemas.microsoft.com/office/drawing/2014/main" val="2202042958"/>
-                  </a:ext>
-                </a:extLst>
-              </a:tr>
-              <a:tr h="481466">
-                <a:tc>
-                  <a:txBody>
-                    <a:bodyPr/>
-                    <a:lstStyle/>
-                    <a:p>
-                      <a:pPr marL="266700" marR="0" lvl="0" indent="-266700" algn="l" defTabSz="914400" rtl="0" eaLnBrk="1" fontAlgn="auto" latinLnBrk="0" hangingPunct="1">
-                        <a:lnSpc>
-                          <a:spcPct val="100000"/>
-                        </a:lnSpc>
-                        <a:spcBef>
-                          <a:spcPts val="0"/>
-                        </a:spcBef>
-                        <a:spcAft>
-                          <a:spcPts val="0"/>
-                        </a:spcAft>
-                        <a:buClr>
-                          <a:srgbClr val="C00000"/>
-                        </a:buClr>
-                        <a:buSzPct val="100000"/>
-                        <a:buFont typeface="Courier New" panose="02070309020205020404" pitchFamily="49" charset="0"/>
-                        <a:buChar char="&gt;"/>
-                        <a:tabLst/>
-                        <a:defRPr/>
-                      </a:pPr>
-                      <a:r>
-                        <a:rPr lang="pt-BR" sz="1800" b="1" baseline="0" dirty="0">
-                          <a:latin typeface="Courier New" panose="02070309020205020404" pitchFamily="49" charset="0"/>
-                          <a:cs typeface="Courier New" panose="02070309020205020404" pitchFamily="49" charset="0"/>
-                        </a:rPr>
-                        <a:t>student_DD </a:t>
-                      </a:r>
-                      <a:r>
-                        <a:rPr lang="pt-BR" sz="1800" b="1" baseline="0" dirty="0">
-                          <a:solidFill>
-                            <a:srgbClr val="C00000"/>
-                          </a:solidFill>
-                          <a:latin typeface="Courier New" panose="02070309020205020404" pitchFamily="49" charset="0"/>
-                          <a:cs typeface="Courier New" panose="02070309020205020404" pitchFamily="49" charset="0"/>
-                        </a:rPr>
-                        <a:t>&lt;</a:t>
-                      </a:r>
-                      <a:r>
-                        <a:rPr lang="pt-BR" sz="1800" b="1" baseline="0" dirty="0">
-                          <a:latin typeface="Courier New" panose="02070309020205020404" pitchFamily="49" charset="0"/>
-                          <a:cs typeface="Courier New" panose="02070309020205020404" pitchFamily="49" charset="0"/>
-                        </a:rPr>
-                        <a:t> student_MM</a:t>
-                      </a:r>
-                    </a:p>
-                    <a:p>
-                      <a:pPr marL="266700" indent="-266700">
-                        <a:buClr>
-                          <a:schemeClr val="accent1">
-                            <a:lumMod val="50000"/>
-                          </a:schemeClr>
-                        </a:buClr>
-                        <a:buSzPct val="120000"/>
-                        <a:buFont typeface="Courier New" panose="02070309020205020404" pitchFamily="49" charset="0"/>
-                        <a:buChar char="|"/>
-                      </a:pPr>
-                      <a:r>
-                        <a:rPr lang="pt-BR" sz="1800" b="1" baseline="0" dirty="0">
-                          <a:latin typeface="Courier New" panose="02070309020205020404" pitchFamily="49" charset="0"/>
-                          <a:cs typeface="Courier New" panose="02070309020205020404" pitchFamily="49" charset="0"/>
-                        </a:rPr>
-                        <a:t>True</a:t>
-                      </a:r>
-                    </a:p>
-                    <a:p>
-                      <a:pPr marL="266700" marR="0" lvl="0" indent="-266700" algn="l" defTabSz="914400" rtl="0" eaLnBrk="1" fontAlgn="auto" latinLnBrk="0" hangingPunct="1">
-                        <a:lnSpc>
-                          <a:spcPct val="100000"/>
-                        </a:lnSpc>
-                        <a:spcBef>
-                          <a:spcPts val="0"/>
-                        </a:spcBef>
-                        <a:spcAft>
-                          <a:spcPts val="0"/>
-                        </a:spcAft>
-                        <a:buClr>
-                          <a:srgbClr val="C00000"/>
-                        </a:buClr>
-                        <a:buSzPct val="100000"/>
-                        <a:buFont typeface="Courier New" panose="02070309020205020404" pitchFamily="49" charset="0"/>
-                        <a:buChar char="&gt;"/>
-                        <a:tabLst/>
-                        <a:defRPr/>
-                      </a:pPr>
-                      <a:r>
-                        <a:rPr lang="pt-BR" sz="1800" b="1" baseline="0" dirty="0">
-                          <a:latin typeface="Courier New" panose="02070309020205020404" pitchFamily="49" charset="0"/>
-                          <a:cs typeface="Courier New" panose="02070309020205020404" pitchFamily="49" charset="0"/>
-                        </a:rPr>
-                        <a:t>[x.id for x in students]</a:t>
-                      </a:r>
-                    </a:p>
-                    <a:p>
-                      <a:pPr marL="266700" indent="-266700">
-                        <a:buClr>
-                          <a:schemeClr val="accent1">
-                            <a:lumMod val="50000"/>
-                          </a:schemeClr>
-                        </a:buClr>
-                        <a:buSzPct val="120000"/>
-                        <a:buFont typeface="Courier New" panose="02070309020205020404" pitchFamily="49" charset="0"/>
-                        <a:buChar char="|"/>
-                      </a:pPr>
-                      <a:r>
-                        <a:rPr lang="pt-BR" sz="1800" b="1" baseline="0" dirty="0">
-                          <a:latin typeface="Courier New" panose="02070309020205020404" pitchFamily="49" charset="0"/>
-                          <a:cs typeface="Courier New" panose="02070309020205020404" pitchFamily="49" charset="0"/>
-                        </a:rPr>
-                        <a:t>['243', '107', '777']</a:t>
-                      </a:r>
-                    </a:p>
-                    <a:p>
-                      <a:pPr marL="266700" marR="0" lvl="0" indent="-266700" algn="l" defTabSz="914400" rtl="0" eaLnBrk="1" fontAlgn="auto" latinLnBrk="0" hangingPunct="1">
-                        <a:lnSpc>
-                          <a:spcPct val="100000"/>
-                        </a:lnSpc>
-                        <a:spcBef>
-                          <a:spcPts val="0"/>
-                        </a:spcBef>
-                        <a:spcAft>
-                          <a:spcPts val="0"/>
-                        </a:spcAft>
-                        <a:buClr>
-                          <a:srgbClr val="C00000"/>
-                        </a:buClr>
-                        <a:buSzPct val="100000"/>
-                        <a:buFont typeface="Courier New" panose="02070309020205020404" pitchFamily="49" charset="0"/>
-                        <a:buChar char="&gt;"/>
-                        <a:tabLst/>
-                        <a:defRPr/>
-                      </a:pPr>
-                      <a:r>
-                        <a:rPr lang="pt-BR" sz="1800" b="1" baseline="0" dirty="0">
-                          <a:latin typeface="Courier New" panose="02070309020205020404" pitchFamily="49" charset="0"/>
-                          <a:cs typeface="Courier New" panose="02070309020205020404" pitchFamily="49" charset="0"/>
-                        </a:rPr>
-                        <a:t>[x.id for x in </a:t>
-                      </a:r>
-                      <a:r>
-                        <a:rPr lang="pt-BR" sz="1800" b="1" baseline="0" dirty="0">
-                          <a:solidFill>
-                            <a:srgbClr val="C00000"/>
-                          </a:solidFill>
-                          <a:latin typeface="Courier New" panose="02070309020205020404" pitchFamily="49" charset="0"/>
-                          <a:cs typeface="Courier New" panose="02070309020205020404" pitchFamily="49" charset="0"/>
-                        </a:rPr>
-                        <a:t>sorted</a:t>
-                      </a:r>
-                      <a:r>
-                        <a:rPr lang="pt-BR" sz="1800" b="1" baseline="0" dirty="0">
-                          <a:latin typeface="Courier New" panose="02070309020205020404" pitchFamily="49" charset="0"/>
-                          <a:cs typeface="Courier New" panose="02070309020205020404" pitchFamily="49" charset="0"/>
-                        </a:rPr>
-                        <a:t>(students)]</a:t>
-                      </a:r>
-                    </a:p>
-                    <a:p>
-                      <a:pPr marL="266700" indent="-266700">
-                        <a:buClr>
-                          <a:schemeClr val="accent1">
-                            <a:lumMod val="50000"/>
-                          </a:schemeClr>
-                        </a:buClr>
-                        <a:buSzPct val="120000"/>
-                        <a:buFont typeface="Courier New" panose="02070309020205020404" pitchFamily="49" charset="0"/>
-                        <a:buChar char="|"/>
-                      </a:pPr>
-                      <a:r>
-                        <a:rPr lang="pt-BR" sz="1800" b="1" baseline="0" dirty="0">
-                          <a:latin typeface="Courier New" panose="02070309020205020404" pitchFamily="49" charset="0"/>
-                          <a:cs typeface="Courier New" panose="02070309020205020404" pitchFamily="49" charset="0"/>
-                        </a:rPr>
-                        <a:t>['107', '243', '777']</a:t>
-                      </a:r>
-                    </a:p>
-                  </a:txBody>
-                  <a:tcPr>
-                    <a:lnL w="6350" cap="flat" cmpd="sng" algn="ctr">
-                      <a:solidFill>
-                        <a:schemeClr val="tx1"/>
-                      </a:solidFill>
-                      <a:prstDash val="solid"/>
-                      <a:round/>
-                      <a:headEnd type="none" w="med" len="med"/>
-                      <a:tailEnd type="none" w="med" len="med"/>
-                    </a:lnL>
-                    <a:lnR w="6350" cap="flat" cmpd="sng" algn="ctr">
-                      <a:solidFill>
-                        <a:schemeClr val="tx1"/>
-                      </a:solidFill>
-                      <a:prstDash val="solid"/>
-                      <a:round/>
-                      <a:headEnd type="none" w="med" len="med"/>
-                      <a:tailEnd type="none" w="med" len="med"/>
-                    </a:lnR>
-                    <a:lnT w="6350" cap="flat" cmpd="sng" algn="ctr">
-                      <a:solidFill>
-                        <a:schemeClr val="tx1"/>
-                      </a:solidFill>
-                      <a:prstDash val="solid"/>
-                      <a:round/>
-                      <a:headEnd type="none" w="med" len="med"/>
-                      <a:tailEnd type="none" w="med" len="med"/>
-                    </a:lnT>
-                    <a:lnB w="6350" cap="flat" cmpd="sng" algn="ctr">
-                      <a:solidFill>
-                        <a:schemeClr val="tx1"/>
-                      </a:solidFill>
-                      <a:prstDash val="solid"/>
-                      <a:round/>
-                      <a:headEnd type="none" w="med" len="med"/>
-                      <a:tailEnd type="none" w="med" len="med"/>
-                    </a:lnB>
-                    <a:lnTlToBr w="12700" cmpd="sng">
-                      <a:noFill/>
-                      <a:prstDash val="solid"/>
-                    </a:lnTlToBr>
-                    <a:lnBlToTr w="12700" cmpd="sng">
-                      <a:noFill/>
-                      <a:prstDash val="solid"/>
-                    </a:lnBlToTr>
-                    <a:solidFill>
-                      <a:schemeClr val="accent5">
-                        <a:lumMod val="20000"/>
-                        <a:lumOff val="80000"/>
-                      </a:schemeClr>
-                    </a:solidFill>
-                  </a:tcPr>
-                </a:tc>
-                <a:extLst>
-                  <a:ext uri="{0D108BD9-81ED-4DB2-BD59-A6C34878D82A}">
-                    <a16:rowId xmlns:a16="http://schemas.microsoft.com/office/drawing/2014/main" val="25355368"/>
-                  </a:ext>
-                </a:extLst>
-              </a:tr>
-            </a:tbl>
-          </a:graphicData>
-        </a:graphic>
-      </p:graphicFrame>
-    </p:spTree>
-    <p:extLst>
-      <p:ext uri="{BB962C8B-B14F-4D97-AF65-F5344CB8AC3E}">
-        <p14:creationId xmlns:p14="http://schemas.microsoft.com/office/powerpoint/2010/main" val="14148027"/>
-      </p:ext>
-    </p:extLst>
-  </p:cSld>
-  <p:clrMapOvr>
-    <a:masterClrMapping/>
-  </p:clrMapOvr>
-</p:sld>
-</file>
-
-<file path=ppt/slides/slide15.xml><?xml version="1.0" encoding="utf-8"?>
-<p:sld xmlns:a="http://schemas.openxmlformats.org/drawingml/2006/main" xmlns:r="http://schemas.openxmlformats.org/officeDocument/2006/relationships" xmlns:p="http://schemas.openxmlformats.org/presentationml/2006/main">
-  <p:cSld>
-    <p:spTree>
-      <p:nvGrpSpPr>
-        <p:cNvPr id="1" name=""/>
-        <p:cNvGrpSpPr/>
-        <p:nvPr/>
-      </p:nvGrpSpPr>
-      <p:grpSpPr>
-        <a:xfrm>
-          <a:off x="0" y="0"/>
-          <a:ext cx="0" cy="0"/>
-          <a:chOff x="0" y="0"/>
-          <a:chExt cx="0" cy="0"/>
-        </a:xfrm>
-      </p:grpSpPr>
-      <p:sp>
-        <p:nvSpPr>
-          <p:cNvPr id="2" name="Title 1"/>
-          <p:cNvSpPr>
-            <a:spLocks noGrp="1"/>
-          </p:cNvSpPr>
-          <p:nvPr>
-            <p:ph type="title"/>
-          </p:nvPr>
-        </p:nvSpPr>
-        <p:spPr/>
-        <p:txBody>
-          <a:bodyPr/>
-          <a:lstStyle/>
-          <a:p>
-            <a:r>
-              <a:rPr lang="da-DK" dirty="0" err="1"/>
               <a:t>Converting</a:t>
             </a:r>
             <a:r>
@@ -11493,6 +10550,949 @@
     <p:extLst>
       <p:ext uri="{BB962C8B-B14F-4D97-AF65-F5344CB8AC3E}">
         <p14:creationId xmlns:p14="http://schemas.microsoft.com/office/powerpoint/2010/main" val="1240346704"/>
+      </p:ext>
+    </p:extLst>
+  </p:cSld>
+  <p:clrMapOvr>
+    <a:masterClrMapping/>
+  </p:clrMapOvr>
+</p:sld>
+</file>
+
+<file path=ppt/slides/slide15.xml><?xml version="1.0" encoding="utf-8"?>
+<p:sld xmlns:a="http://schemas.openxmlformats.org/drawingml/2006/main" xmlns:r="http://schemas.openxmlformats.org/officeDocument/2006/relationships" xmlns:p="http://schemas.openxmlformats.org/presentationml/2006/main">
+  <p:cSld>
+    <p:spTree>
+      <p:nvGrpSpPr>
+        <p:cNvPr id="1" name=""/>
+        <p:cNvGrpSpPr/>
+        <p:nvPr/>
+      </p:nvGrpSpPr>
+      <p:grpSpPr>
+        <a:xfrm>
+          <a:off x="0" y="0"/>
+          <a:ext cx="0" cy="0"/>
+          <a:chOff x="0" y="0"/>
+          <a:chExt cx="0" cy="0"/>
+        </a:xfrm>
+      </p:grpSpPr>
+      <p:sp>
+        <p:nvSpPr>
+          <p:cNvPr id="2" name="Title 1"/>
+          <p:cNvSpPr>
+            <a:spLocks noGrp="1"/>
+          </p:cNvSpPr>
+          <p:nvPr>
+            <p:ph type="title"/>
+          </p:nvPr>
+        </p:nvSpPr>
+        <p:spPr/>
+        <p:txBody>
+          <a:bodyPr/>
+          <a:lstStyle/>
+          <a:p>
+            <a:r>
+              <a:rPr lang="da-DK" dirty="0" err="1"/>
+              <a:t>Defining</a:t>
+            </a:r>
+            <a:r>
+              <a:rPr lang="da-DK" dirty="0"/>
+              <a:t> </a:t>
+            </a:r>
+            <a:r>
+              <a:rPr lang="da-DK" dirty="0" err="1"/>
+              <a:t>order</a:t>
+            </a:r>
+            <a:r>
+              <a:rPr lang="da-DK" dirty="0"/>
+              <a:t> on </a:t>
+            </a:r>
+            <a:r>
+              <a:rPr lang="da-DK" dirty="0" err="1"/>
+              <a:t>instances</a:t>
+            </a:r>
+            <a:r>
+              <a:rPr lang="da-DK" dirty="0"/>
+              <a:t> of a </a:t>
+            </a:r>
+            <a:r>
+              <a:rPr lang="da-DK" dirty="0" err="1"/>
+              <a:t>class</a:t>
+            </a:r>
+            <a:r>
+              <a:rPr lang="da-DK" dirty="0"/>
+              <a:t> (</a:t>
+            </a:r>
+            <a:r>
+              <a:rPr lang="da-DK" dirty="0" err="1"/>
+              <a:t>sorting</a:t>
+            </a:r>
+            <a:r>
+              <a:rPr lang="da-DK" dirty="0"/>
+              <a:t>)</a:t>
+            </a:r>
+            <a:endParaRPr lang="en-US" dirty="0"/>
+          </a:p>
+        </p:txBody>
+      </p:sp>
+      <p:sp>
+        <p:nvSpPr>
+          <p:cNvPr id="3" name="Content Placeholder 2"/>
+          <p:cNvSpPr>
+            <a:spLocks noGrp="1"/>
+          </p:cNvSpPr>
+          <p:nvPr>
+            <p:ph idx="1"/>
+          </p:nvPr>
+        </p:nvSpPr>
+        <p:spPr>
+          <a:xfrm>
+            <a:off x="609601" y="2309654"/>
+            <a:ext cx="5192487" cy="2931432"/>
+          </a:xfrm>
+        </p:spPr>
+        <p:txBody>
+          <a:bodyPr>
+            <a:normAutofit/>
+          </a:bodyPr>
+          <a:lstStyle/>
+          <a:p>
+            <a:r>
+              <a:rPr lang="da-DK" sz="2400" dirty="0"/>
+              <a:t>To </a:t>
+            </a:r>
+            <a:r>
+              <a:rPr lang="da-DK" sz="2400" dirty="0" err="1"/>
+              <a:t>define</a:t>
+            </a:r>
+            <a:r>
+              <a:rPr lang="da-DK" sz="2400" dirty="0"/>
+              <a:t> an </a:t>
+            </a:r>
+            <a:r>
+              <a:rPr lang="da-DK" sz="2400" dirty="0" err="1"/>
+              <a:t>order</a:t>
+            </a:r>
+            <a:r>
+              <a:rPr lang="da-DK" sz="2400" dirty="0"/>
+              <a:t> on </a:t>
+            </a:r>
+            <a:r>
+              <a:rPr lang="da-DK" sz="2400" dirty="0" err="1"/>
+              <a:t>objects</a:t>
+            </a:r>
+            <a:r>
+              <a:rPr lang="da-DK" sz="2400" dirty="0"/>
+              <a:t>,</a:t>
+            </a:r>
+            <a:r>
+              <a:rPr lang="en-US" sz="2400" dirty="0"/>
+              <a:t> define the “&lt;“ operator by defining </a:t>
+            </a:r>
+            <a:r>
+              <a:rPr lang="en-US" sz="2400" dirty="0">
+                <a:latin typeface="Courier New" panose="02070309020205020404" pitchFamily="49" charset="0"/>
+                <a:cs typeface="Courier New" panose="02070309020205020404" pitchFamily="49" charset="0"/>
+              </a:rPr>
+              <a:t>__</a:t>
+            </a:r>
+            <a:r>
+              <a:rPr lang="en-US" sz="2400" dirty="0" err="1">
+                <a:latin typeface="Courier New" panose="02070309020205020404" pitchFamily="49" charset="0"/>
+                <a:cs typeface="Courier New" panose="02070309020205020404" pitchFamily="49" charset="0"/>
+              </a:rPr>
+              <a:t>lt</a:t>
+            </a:r>
+            <a:r>
+              <a:rPr lang="en-US" sz="2400" dirty="0">
+                <a:latin typeface="Courier New" panose="02070309020205020404" pitchFamily="49" charset="0"/>
+                <a:cs typeface="Courier New" panose="02070309020205020404" pitchFamily="49" charset="0"/>
+              </a:rPr>
+              <a:t>__</a:t>
+            </a:r>
+          </a:p>
+          <a:p>
+            <a:endParaRPr lang="da-DK" sz="2400" dirty="0">
+              <a:latin typeface="Courier New" panose="02070309020205020404" pitchFamily="49" charset="0"/>
+              <a:cs typeface="Courier New" panose="02070309020205020404" pitchFamily="49" charset="0"/>
+            </a:endParaRPr>
+          </a:p>
+          <a:p>
+            <a:r>
+              <a:rPr lang="da-DK" sz="2400" dirty="0" err="1"/>
+              <a:t>When</a:t>
+            </a:r>
+            <a:r>
+              <a:rPr lang="da-DK" sz="2400" dirty="0"/>
+              <a:t> ”</a:t>
+            </a:r>
+            <a:r>
+              <a:rPr lang="da-DK" sz="2400" dirty="0">
+                <a:latin typeface="Courier New" panose="02070309020205020404" pitchFamily="49" charset="0"/>
+                <a:cs typeface="Courier New" panose="02070309020205020404" pitchFamily="49" charset="0"/>
+              </a:rPr>
+              <a:t>&lt;</a:t>
+            </a:r>
+            <a:r>
+              <a:rPr lang="da-DK" sz="2400" dirty="0"/>
+              <a:t>” is </a:t>
+            </a:r>
+            <a:r>
+              <a:rPr lang="da-DK" sz="2400" dirty="0" err="1"/>
+              <a:t>defined</a:t>
+            </a:r>
+            <a:r>
+              <a:rPr lang="da-DK" sz="2400" dirty="0"/>
+              <a:t> a list </a:t>
+            </a:r>
+            <a:r>
+              <a:rPr lang="da-DK" sz="2400" dirty="0">
+                <a:latin typeface="Courier New" panose="02070309020205020404" pitchFamily="49" charset="0"/>
+                <a:cs typeface="Courier New" panose="02070309020205020404" pitchFamily="49" charset="0"/>
+              </a:rPr>
+              <a:t>L</a:t>
+            </a:r>
+            <a:r>
+              <a:rPr lang="da-DK" sz="2400" dirty="0"/>
+              <a:t> of students </a:t>
+            </a:r>
+            <a:r>
+              <a:rPr lang="da-DK" sz="2400" dirty="0" err="1"/>
+              <a:t>can</a:t>
+            </a:r>
+            <a:r>
+              <a:rPr lang="da-DK" sz="2400" dirty="0"/>
+              <a:t> </a:t>
+            </a:r>
+            <a:r>
+              <a:rPr lang="da-DK" sz="2400" dirty="0" err="1"/>
+              <a:t>be</a:t>
+            </a:r>
+            <a:r>
+              <a:rPr lang="da-DK" sz="2400" dirty="0"/>
+              <a:t> </a:t>
+            </a:r>
+            <a:r>
+              <a:rPr lang="da-DK" sz="2400" dirty="0" err="1"/>
+              <a:t>sorted</a:t>
+            </a:r>
+            <a:r>
+              <a:rPr lang="da-DK" sz="2400" dirty="0"/>
+              <a:t> </a:t>
+            </a:r>
+            <a:r>
+              <a:rPr lang="da-DK" sz="2400" dirty="0" err="1"/>
+              <a:t>using</a:t>
+            </a:r>
+            <a:r>
+              <a:rPr lang="da-DK" sz="2400" dirty="0"/>
+              <a:t> </a:t>
+            </a:r>
+            <a:r>
+              <a:rPr lang="da-DK" sz="2400" dirty="0" err="1">
+                <a:latin typeface="Courier New" panose="02070309020205020404" pitchFamily="49" charset="0"/>
+                <a:cs typeface="Courier New" panose="02070309020205020404" pitchFamily="49" charset="0"/>
+              </a:rPr>
+              <a:t>sorted</a:t>
+            </a:r>
+            <a:r>
+              <a:rPr lang="da-DK" sz="2400" dirty="0">
+                <a:latin typeface="Courier New" panose="02070309020205020404" pitchFamily="49" charset="0"/>
+                <a:cs typeface="Courier New" panose="02070309020205020404" pitchFamily="49" charset="0"/>
+              </a:rPr>
+              <a:t>(L)</a:t>
+            </a:r>
+            <a:r>
+              <a:rPr lang="da-DK" sz="2400" dirty="0"/>
+              <a:t> and </a:t>
+            </a:r>
+            <a:r>
+              <a:rPr lang="da-DK" sz="2400" dirty="0" err="1">
+                <a:latin typeface="Courier New" panose="02070309020205020404" pitchFamily="49" charset="0"/>
+                <a:cs typeface="Courier New" panose="02070309020205020404" pitchFamily="49" charset="0"/>
+              </a:rPr>
+              <a:t>L.sort</a:t>
+            </a:r>
+            <a:r>
+              <a:rPr lang="da-DK" sz="2400" dirty="0">
+                <a:latin typeface="Courier New" panose="02070309020205020404" pitchFamily="49" charset="0"/>
+                <a:cs typeface="Courier New" panose="02070309020205020404" pitchFamily="49" charset="0"/>
+              </a:rPr>
+              <a:t>()</a:t>
+            </a:r>
+          </a:p>
+        </p:txBody>
+      </p:sp>
+      <p:graphicFrame>
+        <p:nvGraphicFramePr>
+          <p:cNvPr id="5" name="Table 4"/>
+          <p:cNvGraphicFramePr>
+            <a:graphicFrameLocks noGrp="1"/>
+          </p:cNvGraphicFramePr>
+          <p:nvPr>
+            <p:extLst>
+              <p:ext uri="{D42A27DB-BD31-4B8C-83A1-F6EECF244321}">
+                <p14:modId xmlns:p14="http://schemas.microsoft.com/office/powerpoint/2010/main" val="1969140147"/>
+              </p:ext>
+            </p:extLst>
+          </p:nvPr>
+        </p:nvGraphicFramePr>
+        <p:xfrm>
+          <a:off x="5992961" y="2309654"/>
+          <a:ext cx="5643880" cy="3931920"/>
+        </p:xfrm>
+        <a:graphic>
+          <a:graphicData uri="http://schemas.openxmlformats.org/drawingml/2006/table">
+            <a:tbl>
+              <a:tblPr firstRow="1" bandRow="1">
+                <a:tableStyleId>{5C22544A-7EE6-4342-B048-85BDC9FD1C3A}</a:tableStyleId>
+              </a:tblPr>
+              <a:tblGrid>
+                <a:gridCol w="5643880">
+                  <a:extLst>
+                    <a:ext uri="{9D8B030D-6E8A-4147-A177-3AD203B41FA5}">
+                      <a16:colId xmlns:a16="http://schemas.microsoft.com/office/drawing/2014/main" val="1873682825"/>
+                    </a:ext>
+                  </a:extLst>
+                </a:gridCol>
+              </a:tblGrid>
+              <a:tr h="148143">
+                <a:tc>
+                  <a:txBody>
+                    <a:bodyPr/>
+                    <a:lstStyle/>
+                    <a:p>
+                      <a:r>
+                        <a:rPr lang="da-DK" sz="1800" b="1" dirty="0">
+                          <a:latin typeface="Courier New" panose="02070309020205020404" pitchFamily="49" charset="0"/>
+                          <a:cs typeface="Courier New" panose="02070309020205020404" pitchFamily="49" charset="0"/>
+                        </a:rPr>
+                        <a:t>student.py</a:t>
+                      </a:r>
+                    </a:p>
+                  </a:txBody>
+                  <a:tcPr anchor="ctr">
+                    <a:lnL w="6350" cap="flat" cmpd="sng" algn="ctr">
+                      <a:solidFill>
+                        <a:schemeClr val="tx1"/>
+                      </a:solidFill>
+                      <a:prstDash val="solid"/>
+                      <a:round/>
+                      <a:headEnd type="none" w="med" len="med"/>
+                      <a:tailEnd type="none" w="med" len="med"/>
+                    </a:lnL>
+                    <a:lnR w="6350" cap="flat" cmpd="sng" algn="ctr">
+                      <a:solidFill>
+                        <a:schemeClr val="tx1"/>
+                      </a:solidFill>
+                      <a:prstDash val="solid"/>
+                      <a:round/>
+                      <a:headEnd type="none" w="med" len="med"/>
+                      <a:tailEnd type="none" w="med" len="med"/>
+                    </a:lnR>
+                    <a:lnT w="6350" cap="flat" cmpd="sng" algn="ctr">
+                      <a:solidFill>
+                        <a:schemeClr val="tx1"/>
+                      </a:solidFill>
+                      <a:prstDash val="solid"/>
+                      <a:round/>
+                      <a:headEnd type="none" w="med" len="med"/>
+                      <a:tailEnd type="none" w="med" len="med"/>
+                    </a:lnT>
+                    <a:lnB w="6350" cap="flat" cmpd="sng" algn="ctr">
+                      <a:solidFill>
+                        <a:schemeClr val="tx1"/>
+                      </a:solidFill>
+                      <a:prstDash val="solid"/>
+                      <a:round/>
+                      <a:headEnd type="none" w="med" len="med"/>
+                      <a:tailEnd type="none" w="med" len="med"/>
+                    </a:lnB>
+                    <a:lnTlToBr w="12700" cmpd="sng">
+                      <a:noFill/>
+                      <a:prstDash val="solid"/>
+                    </a:lnTlToBr>
+                    <a:lnBlToTr w="12700" cmpd="sng">
+                      <a:noFill/>
+                      <a:prstDash val="solid"/>
+                    </a:lnBlToTr>
+                    <a:solidFill>
+                      <a:srgbClr val="C00000"/>
+                    </a:solidFill>
+                  </a:tcPr>
+                </a:tc>
+                <a:extLst>
+                  <a:ext uri="{0D108BD9-81ED-4DB2-BD59-A6C34878D82A}">
+                    <a16:rowId xmlns:a16="http://schemas.microsoft.com/office/drawing/2014/main" val="3330819881"/>
+                  </a:ext>
+                </a:extLst>
+              </a:tr>
+              <a:tr h="297347">
+                <a:tc>
+                  <a:txBody>
+                    <a:bodyPr/>
+                    <a:lstStyle/>
+                    <a:p>
+                      <a:r>
+                        <a:rPr lang="en-US" sz="1800" b="1" dirty="0">
+                          <a:solidFill>
+                            <a:schemeClr val="accent1">
+                              <a:lumMod val="50000"/>
+                            </a:schemeClr>
+                          </a:solidFill>
+                          <a:latin typeface="Courier New" panose="02070309020205020404" pitchFamily="49" charset="0"/>
+                          <a:cs typeface="Courier New" panose="02070309020205020404" pitchFamily="49" charset="0"/>
+                        </a:rPr>
+                        <a:t>class</a:t>
+                      </a:r>
+                      <a:r>
+                        <a:rPr lang="en-US" sz="1800" b="1" dirty="0">
+                          <a:solidFill>
+                            <a:schemeClr val="tx1"/>
+                          </a:solidFill>
+                          <a:latin typeface="Courier New" panose="02070309020205020404" pitchFamily="49" charset="0"/>
+                          <a:cs typeface="Courier New" panose="02070309020205020404" pitchFamily="49" charset="0"/>
+                        </a:rPr>
+                        <a:t> Student:</a:t>
+                      </a:r>
+                    </a:p>
+                    <a:p>
+                      <a:r>
+                        <a:rPr lang="en-US" sz="1800" b="1" dirty="0">
+                          <a:solidFill>
+                            <a:schemeClr val="tx1"/>
+                          </a:solidFill>
+                          <a:latin typeface="Courier New" panose="02070309020205020404" pitchFamily="49" charset="0"/>
+                          <a:cs typeface="Courier New" panose="02070309020205020404" pitchFamily="49" charset="0"/>
+                        </a:rPr>
+                        <a:t>    </a:t>
+                      </a:r>
+                      <a:r>
+                        <a:rPr lang="en-US" sz="1800" b="1" dirty="0" err="1">
+                          <a:solidFill>
+                            <a:schemeClr val="accent1">
+                              <a:lumMod val="50000"/>
+                            </a:schemeClr>
+                          </a:solidFill>
+                          <a:latin typeface="Courier New" panose="02070309020205020404" pitchFamily="49" charset="0"/>
+                          <a:cs typeface="Courier New" panose="02070309020205020404" pitchFamily="49" charset="0"/>
+                        </a:rPr>
+                        <a:t>def</a:t>
+                      </a:r>
+                      <a:r>
+                        <a:rPr lang="en-US" sz="1800" b="1" dirty="0">
+                          <a:solidFill>
+                            <a:schemeClr val="tx1"/>
+                          </a:solidFill>
+                          <a:latin typeface="Courier New" panose="02070309020205020404" pitchFamily="49" charset="0"/>
+                          <a:cs typeface="Courier New" panose="02070309020205020404" pitchFamily="49" charset="0"/>
+                        </a:rPr>
+                        <a:t> </a:t>
+                      </a:r>
+                      <a:r>
+                        <a:rPr lang="en-US" sz="1800" b="1" dirty="0">
+                          <a:solidFill>
+                            <a:srgbClr val="C00000"/>
+                          </a:solidFill>
+                          <a:latin typeface="Courier New" panose="02070309020205020404" pitchFamily="49" charset="0"/>
+                          <a:cs typeface="Courier New" panose="02070309020205020404" pitchFamily="49" charset="0"/>
+                        </a:rPr>
+                        <a:t>__</a:t>
+                      </a:r>
+                      <a:r>
+                        <a:rPr lang="en-US" sz="1800" b="1" dirty="0" err="1">
+                          <a:solidFill>
+                            <a:srgbClr val="C00000"/>
+                          </a:solidFill>
+                          <a:latin typeface="Courier New" panose="02070309020205020404" pitchFamily="49" charset="0"/>
+                          <a:cs typeface="Courier New" panose="02070309020205020404" pitchFamily="49" charset="0"/>
+                        </a:rPr>
+                        <a:t>lt</a:t>
+                      </a:r>
+                      <a:r>
+                        <a:rPr lang="en-US" sz="1800" b="1" dirty="0">
+                          <a:solidFill>
+                            <a:srgbClr val="C00000"/>
+                          </a:solidFill>
+                          <a:latin typeface="Courier New" panose="02070309020205020404" pitchFamily="49" charset="0"/>
+                          <a:cs typeface="Courier New" panose="02070309020205020404" pitchFamily="49" charset="0"/>
+                        </a:rPr>
+                        <a:t>__</a:t>
+                      </a:r>
+                      <a:r>
+                        <a:rPr lang="en-US" sz="1800" b="1" dirty="0">
+                          <a:solidFill>
+                            <a:schemeClr val="tx1"/>
+                          </a:solidFill>
+                          <a:latin typeface="Courier New" panose="02070309020205020404" pitchFamily="49" charset="0"/>
+                          <a:cs typeface="Courier New" panose="02070309020205020404" pitchFamily="49" charset="0"/>
+                        </a:rPr>
+                        <a:t>(self, other):</a:t>
+                      </a:r>
+                    </a:p>
+                    <a:p>
+                      <a:r>
+                        <a:rPr lang="en-US" sz="1800" b="1" dirty="0">
+                          <a:solidFill>
+                            <a:schemeClr val="tx1"/>
+                          </a:solidFill>
+                          <a:latin typeface="Courier New" panose="02070309020205020404" pitchFamily="49" charset="0"/>
+                          <a:cs typeface="Courier New" panose="02070309020205020404" pitchFamily="49" charset="0"/>
+                        </a:rPr>
+                        <a:t>        return self.id &lt; other.id</a:t>
+                      </a:r>
+                    </a:p>
+                    <a:p>
+                      <a:endParaRPr lang="en-US" sz="1800" b="1" dirty="0">
+                        <a:solidFill>
+                          <a:schemeClr val="tx1"/>
+                        </a:solidFill>
+                        <a:latin typeface="Courier New" panose="02070309020205020404" pitchFamily="49" charset="0"/>
+                        <a:cs typeface="Courier New" panose="02070309020205020404" pitchFamily="49" charset="0"/>
+                      </a:endParaRPr>
+                    </a:p>
+                    <a:p>
+                      <a:r>
+                        <a:rPr lang="en-US" sz="1800" b="1" dirty="0">
+                          <a:solidFill>
+                            <a:schemeClr val="tx1"/>
+                          </a:solidFill>
+                          <a:latin typeface="Courier New" panose="02070309020205020404" pitchFamily="49" charset="0"/>
+                          <a:cs typeface="Courier New" panose="02070309020205020404" pitchFamily="49" charset="0"/>
+                        </a:rPr>
+                        <a:t>    ... </a:t>
+                      </a:r>
+                      <a:r>
+                        <a:rPr lang="en-US" sz="1800" b="1" dirty="0">
+                          <a:solidFill>
+                            <a:schemeClr val="bg1">
+                              <a:lumMod val="50000"/>
+                            </a:schemeClr>
+                          </a:solidFill>
+                          <a:latin typeface="Courier New" panose="02070309020205020404" pitchFamily="49" charset="0"/>
+                          <a:cs typeface="Courier New" panose="02070309020205020404" pitchFamily="49" charset="0"/>
+                        </a:rPr>
+                        <a:t>previous method definitions ...</a:t>
+                      </a:r>
+                      <a:endParaRPr lang="pt-BR" sz="1800" b="1" dirty="0">
+                        <a:solidFill>
+                          <a:schemeClr val="bg1">
+                            <a:lumMod val="50000"/>
+                          </a:schemeClr>
+                        </a:solidFill>
+                        <a:latin typeface="Courier New" panose="02070309020205020404" pitchFamily="49" charset="0"/>
+                        <a:cs typeface="Courier New" panose="02070309020205020404" pitchFamily="49" charset="0"/>
+                      </a:endParaRPr>
+                    </a:p>
+                  </a:txBody>
+                  <a:tcPr>
+                    <a:lnL w="6350" cap="flat" cmpd="sng" algn="ctr">
+                      <a:solidFill>
+                        <a:schemeClr val="tx1"/>
+                      </a:solidFill>
+                      <a:prstDash val="solid"/>
+                      <a:round/>
+                      <a:headEnd type="none" w="med" len="med"/>
+                      <a:tailEnd type="none" w="med" len="med"/>
+                    </a:lnL>
+                    <a:lnR w="6350" cap="flat" cmpd="sng" algn="ctr">
+                      <a:solidFill>
+                        <a:schemeClr val="tx1"/>
+                      </a:solidFill>
+                      <a:prstDash val="solid"/>
+                      <a:round/>
+                      <a:headEnd type="none" w="med" len="med"/>
+                      <a:tailEnd type="none" w="med" len="med"/>
+                    </a:lnR>
+                    <a:lnT w="6350" cap="flat" cmpd="sng" algn="ctr">
+                      <a:solidFill>
+                        <a:schemeClr val="tx1"/>
+                      </a:solidFill>
+                      <a:prstDash val="solid"/>
+                      <a:round/>
+                      <a:headEnd type="none" w="med" len="med"/>
+                      <a:tailEnd type="none" w="med" len="med"/>
+                    </a:lnT>
+                    <a:lnB w="6350" cap="flat" cmpd="sng" algn="ctr">
+                      <a:solidFill>
+                        <a:schemeClr val="tx1"/>
+                      </a:solidFill>
+                      <a:prstDash val="solid"/>
+                      <a:round/>
+                      <a:headEnd type="none" w="med" len="med"/>
+                      <a:tailEnd type="none" w="med" len="med"/>
+                    </a:lnB>
+                    <a:lnTlToBr w="12700" cmpd="sng">
+                      <a:noFill/>
+                      <a:prstDash val="solid"/>
+                    </a:lnTlToBr>
+                    <a:lnBlToTr w="12700" cmpd="sng">
+                      <a:noFill/>
+                      <a:prstDash val="solid"/>
+                    </a:lnBlToTr>
+                    <a:solidFill>
+                      <a:schemeClr val="accent5">
+                        <a:lumMod val="20000"/>
+                        <a:lumOff val="80000"/>
+                      </a:schemeClr>
+                    </a:solidFill>
+                  </a:tcPr>
+                </a:tc>
+                <a:extLst>
+                  <a:ext uri="{0D108BD9-81ED-4DB2-BD59-A6C34878D82A}">
+                    <a16:rowId xmlns:a16="http://schemas.microsoft.com/office/drawing/2014/main" val="4112970457"/>
+                  </a:ext>
+                </a:extLst>
+              </a:tr>
+              <a:tr h="148143">
+                <a:tc>
+                  <a:txBody>
+                    <a:bodyPr/>
+                    <a:lstStyle/>
+                    <a:p>
+                      <a:r>
+                        <a:rPr lang="da-DK" sz="1800" b="1" dirty="0" err="1">
+                          <a:solidFill>
+                            <a:schemeClr val="bg1"/>
+                          </a:solidFill>
+                          <a:latin typeface="Courier New" panose="02070309020205020404" pitchFamily="49" charset="0"/>
+                          <a:cs typeface="Courier New" panose="02070309020205020404" pitchFamily="49" charset="0"/>
+                        </a:rPr>
+                        <a:t>Python</a:t>
+                      </a:r>
+                      <a:r>
+                        <a:rPr lang="da-DK" sz="1800" b="1" dirty="0">
+                          <a:solidFill>
+                            <a:schemeClr val="bg1"/>
+                          </a:solidFill>
+                          <a:latin typeface="Courier New" panose="02070309020205020404" pitchFamily="49" charset="0"/>
+                          <a:cs typeface="Courier New" panose="02070309020205020404" pitchFamily="49" charset="0"/>
+                        </a:rPr>
+                        <a:t> </a:t>
+                      </a:r>
+                      <a:r>
+                        <a:rPr lang="da-DK" sz="1800" b="1" dirty="0" err="1">
+                          <a:solidFill>
+                            <a:schemeClr val="bg1"/>
+                          </a:solidFill>
+                          <a:latin typeface="Courier New" panose="02070309020205020404" pitchFamily="49" charset="0"/>
+                          <a:cs typeface="Courier New" panose="02070309020205020404" pitchFamily="49" charset="0"/>
+                        </a:rPr>
+                        <a:t>shell</a:t>
+                      </a:r>
+                      <a:endParaRPr lang="da-DK" sz="1800" b="1" dirty="0">
+                        <a:solidFill>
+                          <a:schemeClr val="bg1"/>
+                        </a:solidFill>
+                        <a:latin typeface="Courier New" panose="02070309020205020404" pitchFamily="49" charset="0"/>
+                        <a:cs typeface="Courier New" panose="02070309020205020404" pitchFamily="49" charset="0"/>
+                      </a:endParaRPr>
+                    </a:p>
+                  </a:txBody>
+                  <a:tcPr>
+                    <a:lnL w="6350" cap="flat" cmpd="sng" algn="ctr">
+                      <a:solidFill>
+                        <a:schemeClr val="tx1"/>
+                      </a:solidFill>
+                      <a:prstDash val="solid"/>
+                      <a:round/>
+                      <a:headEnd type="none" w="med" len="med"/>
+                      <a:tailEnd type="none" w="med" len="med"/>
+                    </a:lnL>
+                    <a:lnR w="6350" cap="flat" cmpd="sng" algn="ctr">
+                      <a:solidFill>
+                        <a:schemeClr val="tx1"/>
+                      </a:solidFill>
+                      <a:prstDash val="solid"/>
+                      <a:round/>
+                      <a:headEnd type="none" w="med" len="med"/>
+                      <a:tailEnd type="none" w="med" len="med"/>
+                    </a:lnR>
+                    <a:lnT w="6350" cap="flat" cmpd="sng" algn="ctr">
+                      <a:solidFill>
+                        <a:schemeClr val="tx1"/>
+                      </a:solidFill>
+                      <a:prstDash val="solid"/>
+                      <a:round/>
+                      <a:headEnd type="none" w="med" len="med"/>
+                      <a:tailEnd type="none" w="med" len="med"/>
+                    </a:lnT>
+                    <a:lnB w="6350" cap="flat" cmpd="sng" algn="ctr">
+                      <a:solidFill>
+                        <a:schemeClr val="tx1"/>
+                      </a:solidFill>
+                      <a:prstDash val="solid"/>
+                      <a:round/>
+                      <a:headEnd type="none" w="med" len="med"/>
+                      <a:tailEnd type="none" w="med" len="med"/>
+                    </a:lnB>
+                    <a:lnTlToBr w="12700" cmpd="sng">
+                      <a:noFill/>
+                      <a:prstDash val="solid"/>
+                    </a:lnTlToBr>
+                    <a:lnBlToTr w="12700" cmpd="sng">
+                      <a:noFill/>
+                      <a:prstDash val="solid"/>
+                    </a:lnBlToTr>
+                    <a:solidFill>
+                      <a:srgbClr val="C00000"/>
+                    </a:solidFill>
+                  </a:tcPr>
+                </a:tc>
+                <a:extLst>
+                  <a:ext uri="{0D108BD9-81ED-4DB2-BD59-A6C34878D82A}">
+                    <a16:rowId xmlns:a16="http://schemas.microsoft.com/office/drawing/2014/main" val="2202042958"/>
+                  </a:ext>
+                </a:extLst>
+              </a:tr>
+              <a:tr h="481466">
+                <a:tc>
+                  <a:txBody>
+                    <a:bodyPr/>
+                    <a:lstStyle/>
+                    <a:p>
+                      <a:pPr marL="266700" marR="0" lvl="0" indent="-266700" algn="l" defTabSz="914400" rtl="0" eaLnBrk="1" fontAlgn="auto" latinLnBrk="0" hangingPunct="1">
+                        <a:lnSpc>
+                          <a:spcPct val="100000"/>
+                        </a:lnSpc>
+                        <a:spcBef>
+                          <a:spcPts val="0"/>
+                        </a:spcBef>
+                        <a:spcAft>
+                          <a:spcPts val="0"/>
+                        </a:spcAft>
+                        <a:buClr>
+                          <a:srgbClr val="C00000"/>
+                        </a:buClr>
+                        <a:buSzPct val="100000"/>
+                        <a:buFont typeface="Courier New" panose="02070309020205020404" pitchFamily="49" charset="0"/>
+                        <a:buChar char="&gt;"/>
+                        <a:tabLst/>
+                        <a:defRPr/>
+                      </a:pPr>
+                      <a:r>
+                        <a:rPr lang="pt-BR" sz="1800" b="1" baseline="0" dirty="0">
+                          <a:latin typeface="Courier New" panose="02070309020205020404" pitchFamily="49" charset="0"/>
+                          <a:cs typeface="Courier New" panose="02070309020205020404" pitchFamily="49" charset="0"/>
+                        </a:rPr>
+                        <a:t>student_DD </a:t>
+                      </a:r>
+                      <a:r>
+                        <a:rPr lang="pt-BR" sz="1800" b="1" baseline="0" dirty="0">
+                          <a:solidFill>
+                            <a:srgbClr val="C00000"/>
+                          </a:solidFill>
+                          <a:latin typeface="Courier New" panose="02070309020205020404" pitchFamily="49" charset="0"/>
+                          <a:cs typeface="Courier New" panose="02070309020205020404" pitchFamily="49" charset="0"/>
+                        </a:rPr>
+                        <a:t>&lt;</a:t>
+                      </a:r>
+                      <a:r>
+                        <a:rPr lang="pt-BR" sz="1800" b="1" baseline="0" dirty="0">
+                          <a:latin typeface="Courier New" panose="02070309020205020404" pitchFamily="49" charset="0"/>
+                          <a:cs typeface="Courier New" panose="02070309020205020404" pitchFamily="49" charset="0"/>
+                        </a:rPr>
+                        <a:t> student_MM</a:t>
+                      </a:r>
+                    </a:p>
+                    <a:p>
+                      <a:pPr marL="266700" indent="-266700">
+                        <a:buClr>
+                          <a:schemeClr val="accent1">
+                            <a:lumMod val="50000"/>
+                          </a:schemeClr>
+                        </a:buClr>
+                        <a:buSzPct val="120000"/>
+                        <a:buFont typeface="Courier New" panose="02070309020205020404" pitchFamily="49" charset="0"/>
+                        <a:buChar char="|"/>
+                      </a:pPr>
+                      <a:r>
+                        <a:rPr lang="pt-BR" sz="1800" b="1" baseline="0" dirty="0">
+                          <a:latin typeface="Courier New" panose="02070309020205020404" pitchFamily="49" charset="0"/>
+                          <a:cs typeface="Courier New" panose="02070309020205020404" pitchFamily="49" charset="0"/>
+                        </a:rPr>
+                        <a:t>True</a:t>
+                      </a:r>
+                    </a:p>
+                    <a:p>
+                      <a:pPr marL="266700" marR="0" lvl="0" indent="-266700" algn="l" defTabSz="914400" rtl="0" eaLnBrk="1" fontAlgn="auto" latinLnBrk="0" hangingPunct="1">
+                        <a:lnSpc>
+                          <a:spcPct val="100000"/>
+                        </a:lnSpc>
+                        <a:spcBef>
+                          <a:spcPts val="0"/>
+                        </a:spcBef>
+                        <a:spcAft>
+                          <a:spcPts val="0"/>
+                        </a:spcAft>
+                        <a:buClr>
+                          <a:srgbClr val="C00000"/>
+                        </a:buClr>
+                        <a:buSzPct val="100000"/>
+                        <a:buFont typeface="Courier New" panose="02070309020205020404" pitchFamily="49" charset="0"/>
+                        <a:buChar char="&gt;"/>
+                        <a:tabLst/>
+                        <a:defRPr/>
+                      </a:pPr>
+                      <a:r>
+                        <a:rPr lang="pt-BR" sz="1800" b="1" baseline="0" dirty="0">
+                          <a:latin typeface="Courier New" panose="02070309020205020404" pitchFamily="49" charset="0"/>
+                          <a:cs typeface="Courier New" panose="02070309020205020404" pitchFamily="49" charset="0"/>
+                        </a:rPr>
+                        <a:t>[x.id for x in students]</a:t>
+                      </a:r>
+                    </a:p>
+                    <a:p>
+                      <a:pPr marL="266700" indent="-266700">
+                        <a:buClr>
+                          <a:schemeClr val="accent1">
+                            <a:lumMod val="50000"/>
+                          </a:schemeClr>
+                        </a:buClr>
+                        <a:buSzPct val="120000"/>
+                        <a:buFont typeface="Courier New" panose="02070309020205020404" pitchFamily="49" charset="0"/>
+                        <a:buChar char="|"/>
+                      </a:pPr>
+                      <a:r>
+                        <a:rPr lang="pt-BR" sz="1800" b="1" baseline="0" dirty="0">
+                          <a:latin typeface="Courier New" panose="02070309020205020404" pitchFamily="49" charset="0"/>
+                          <a:cs typeface="Courier New" panose="02070309020205020404" pitchFamily="49" charset="0"/>
+                        </a:rPr>
+                        <a:t>['243', '107', '777']</a:t>
+                      </a:r>
+                    </a:p>
+                    <a:p>
+                      <a:pPr marL="266700" marR="0" lvl="0" indent="-266700" algn="l" defTabSz="914400" rtl="0" eaLnBrk="1" fontAlgn="auto" latinLnBrk="0" hangingPunct="1">
+                        <a:lnSpc>
+                          <a:spcPct val="100000"/>
+                        </a:lnSpc>
+                        <a:spcBef>
+                          <a:spcPts val="0"/>
+                        </a:spcBef>
+                        <a:spcAft>
+                          <a:spcPts val="0"/>
+                        </a:spcAft>
+                        <a:buClr>
+                          <a:srgbClr val="C00000"/>
+                        </a:buClr>
+                        <a:buSzPct val="100000"/>
+                        <a:buFont typeface="Courier New" panose="02070309020205020404" pitchFamily="49" charset="0"/>
+                        <a:buChar char="&gt;"/>
+                        <a:tabLst/>
+                        <a:defRPr/>
+                      </a:pPr>
+                      <a:r>
+                        <a:rPr lang="pt-BR" sz="1800" b="1" baseline="0" dirty="0">
+                          <a:latin typeface="Courier New" panose="02070309020205020404" pitchFamily="49" charset="0"/>
+                          <a:cs typeface="Courier New" panose="02070309020205020404" pitchFamily="49" charset="0"/>
+                        </a:rPr>
+                        <a:t>[x.id for x in </a:t>
+                      </a:r>
+                      <a:r>
+                        <a:rPr lang="pt-BR" sz="1800" b="1" baseline="0" dirty="0">
+                          <a:solidFill>
+                            <a:srgbClr val="C00000"/>
+                          </a:solidFill>
+                          <a:latin typeface="Courier New" panose="02070309020205020404" pitchFamily="49" charset="0"/>
+                          <a:cs typeface="Courier New" panose="02070309020205020404" pitchFamily="49" charset="0"/>
+                        </a:rPr>
+                        <a:t>sorted</a:t>
+                      </a:r>
+                      <a:r>
+                        <a:rPr lang="pt-BR" sz="1800" b="1" baseline="0" dirty="0">
+                          <a:latin typeface="Courier New" panose="02070309020205020404" pitchFamily="49" charset="0"/>
+                          <a:cs typeface="Courier New" panose="02070309020205020404" pitchFamily="49" charset="0"/>
+                        </a:rPr>
+                        <a:t>(students)]</a:t>
+                      </a:r>
+                    </a:p>
+                    <a:p>
+                      <a:pPr marL="266700" indent="-266700">
+                        <a:buClr>
+                          <a:schemeClr val="accent1">
+                            <a:lumMod val="50000"/>
+                          </a:schemeClr>
+                        </a:buClr>
+                        <a:buSzPct val="120000"/>
+                        <a:buFont typeface="Courier New" panose="02070309020205020404" pitchFamily="49" charset="0"/>
+                        <a:buChar char="|"/>
+                      </a:pPr>
+                      <a:r>
+                        <a:rPr lang="pt-BR" sz="1800" b="1" baseline="0" dirty="0">
+                          <a:latin typeface="Courier New" panose="02070309020205020404" pitchFamily="49" charset="0"/>
+                          <a:cs typeface="Courier New" panose="02070309020205020404" pitchFamily="49" charset="0"/>
+                        </a:rPr>
+                        <a:t>['107', '243', '777']</a:t>
+                      </a:r>
+                    </a:p>
+                  </a:txBody>
+                  <a:tcPr>
+                    <a:lnL w="6350" cap="flat" cmpd="sng" algn="ctr">
+                      <a:solidFill>
+                        <a:schemeClr val="tx1"/>
+                      </a:solidFill>
+                      <a:prstDash val="solid"/>
+                      <a:round/>
+                      <a:headEnd type="none" w="med" len="med"/>
+                      <a:tailEnd type="none" w="med" len="med"/>
+                    </a:lnL>
+                    <a:lnR w="6350" cap="flat" cmpd="sng" algn="ctr">
+                      <a:solidFill>
+                        <a:schemeClr val="tx1"/>
+                      </a:solidFill>
+                      <a:prstDash val="solid"/>
+                      <a:round/>
+                      <a:headEnd type="none" w="med" len="med"/>
+                      <a:tailEnd type="none" w="med" len="med"/>
+                    </a:lnR>
+                    <a:lnT w="6350" cap="flat" cmpd="sng" algn="ctr">
+                      <a:solidFill>
+                        <a:schemeClr val="tx1"/>
+                      </a:solidFill>
+                      <a:prstDash val="solid"/>
+                      <a:round/>
+                      <a:headEnd type="none" w="med" len="med"/>
+                      <a:tailEnd type="none" w="med" len="med"/>
+                    </a:lnT>
+                    <a:lnB w="6350" cap="flat" cmpd="sng" algn="ctr">
+                      <a:solidFill>
+                        <a:schemeClr val="tx1"/>
+                      </a:solidFill>
+                      <a:prstDash val="solid"/>
+                      <a:round/>
+                      <a:headEnd type="none" w="med" len="med"/>
+                      <a:tailEnd type="none" w="med" len="med"/>
+                    </a:lnB>
+                    <a:lnTlToBr w="12700" cmpd="sng">
+                      <a:noFill/>
+                      <a:prstDash val="solid"/>
+                    </a:lnTlToBr>
+                    <a:lnBlToTr w="12700" cmpd="sng">
+                      <a:noFill/>
+                      <a:prstDash val="solid"/>
+                    </a:lnBlToTr>
+                    <a:solidFill>
+                      <a:schemeClr val="accent5">
+                        <a:lumMod val="20000"/>
+                        <a:lumOff val="80000"/>
+                      </a:schemeClr>
+                    </a:solidFill>
+                  </a:tcPr>
+                </a:tc>
+                <a:extLst>
+                  <a:ext uri="{0D108BD9-81ED-4DB2-BD59-A6C34878D82A}">
+                    <a16:rowId xmlns:a16="http://schemas.microsoft.com/office/drawing/2014/main" val="25355368"/>
+                  </a:ext>
+                </a:extLst>
+              </a:tr>
+            </a:tbl>
+          </a:graphicData>
+        </a:graphic>
+      </p:graphicFrame>
+    </p:spTree>
+    <p:extLst>
+      <p:ext uri="{BB962C8B-B14F-4D97-AF65-F5344CB8AC3E}">
+        <p14:creationId xmlns:p14="http://schemas.microsoft.com/office/powerpoint/2010/main" val="14148027"/>
       </p:ext>
     </p:extLst>
   </p:cSld>
@@ -30458,8 +30458,19 @@
               <a:t>non-public</a:t>
             </a:r>
             <a:r>
+              <a:rPr lang="en-US"/>
+              <a:t>. </a:t>
+            </a:r>
+            <a:br>
+              <a:rPr lang="en-US"/>
+            </a:br>
+            <a:r>
+              <a:rPr lang="en-US"/>
+              <a:t>If </a:t>
+            </a:r>
+            <a:r>
               <a:rPr lang="en-US" dirty="0"/>
-              <a:t>. If in doubt, choose non-public; it's easier to make it public later than to make a public attribute non-public.</a:t>
+              <a:t>in doubt, choose non-public; it's easier to make it public later than to make a public attribute non-public.</a:t>
             </a:r>
           </a:p>
           <a:p>

</xml_diff>

<commit_message>
all_slides.pdf all_slides_with_answers.pdf classes.pdf classes.pptx decorators.pdf decorators.pptx dynamic_programming.pdf dynamic_programming.pptx hierarchies.pdf hierarchies.pptx lambda.pdf lambda.pptx
</commit_message>
<xml_diff>
--- a/ipsa/slides/classes.pptx
+++ b/ipsa/slides/classes.pptx
@@ -141,14 +141,6 @@
     </p:ext>
   </p:extLst>
 </p:presentation>
-</file>
-
-<file path=ppt/revisionInfo.xml><?xml version="1.0" encoding="utf-8"?>
-<p1510:revInfo xmlns:a="http://schemas.openxmlformats.org/drawingml/2006/main" xmlns:r="http://schemas.openxmlformats.org/officeDocument/2006/relationships" xmlns:p1510="http://schemas.microsoft.com/office/powerpoint/2015/10/main">
-  <p1510:revLst>
-    <p1510:client id="{9D905D2A-7BDA-40BC-B748-BD3D6CCF9001}" v="1" dt="2025-03-03T17:00:55.221"/>
-  </p1510:revLst>
-</p1510:revInfo>
 </file>
 
 <file path=ppt/changesInfos/changesInfo1.xml><?xml version="1.0" encoding="utf-8"?>
@@ -296,14 +288,6 @@
           <pc:docMk/>
           <pc:sldMk cId="860418074" sldId="639"/>
         </pc:sldMkLst>
-        <pc:spChg chg="mod">
-          <ac:chgData name="Gerth Stølting Brodal" userId="04ef4784-6591-4f86-a140-f5c3b108582a" providerId="ADAL" clId="{9D905D2A-7BDA-40BC-B748-BD3D6CCF9001}" dt="2025-03-05T07:21:06.954" v="69" actId="20577"/>
-          <ac:spMkLst>
-            <pc:docMk/>
-            <pc:sldMk cId="860418074" sldId="639"/>
-            <ac:spMk id="3" creationId="{00000000-0000-0000-0000-000000000000}"/>
-          </ac:spMkLst>
-        </pc:spChg>
       </pc:sldChg>
       <pc:sldChg chg="modSp mod ord">
         <pc:chgData name="Gerth Stølting Brodal" userId="04ef4784-6591-4f86-a140-f5c3b108582a" providerId="ADAL" clId="{9D905D2A-7BDA-40BC-B748-BD3D6CCF9001}" dt="2025-03-05T07:02:05.937" v="68"/>
@@ -311,22 +295,6 @@
           <pc:docMk/>
           <pc:sldMk cId="1240346704" sldId="659"/>
         </pc:sldMkLst>
-        <pc:spChg chg="mod">
-          <ac:chgData name="Gerth Stølting Brodal" userId="04ef4784-6591-4f86-a140-f5c3b108582a" providerId="ADAL" clId="{9D905D2A-7BDA-40BC-B748-BD3D6CCF9001}" dt="2025-03-03T17:01:37.559" v="64" actId="14100"/>
-          <ac:spMkLst>
-            <pc:docMk/>
-            <pc:sldMk cId="1240346704" sldId="659"/>
-            <ac:spMk id="3" creationId="{00000000-0000-0000-0000-000000000000}"/>
-          </ac:spMkLst>
-        </pc:spChg>
-        <pc:graphicFrameChg chg="mod modGraphic">
-          <ac:chgData name="Gerth Stølting Brodal" userId="04ef4784-6591-4f86-a140-f5c3b108582a" providerId="ADAL" clId="{9D905D2A-7BDA-40BC-B748-BD3D6CCF9001}" dt="2025-03-03T17:02:52.756" v="65" actId="1076"/>
-          <ac:graphicFrameMkLst>
-            <pc:docMk/>
-            <pc:sldMk cId="1240346704" sldId="659"/>
-            <ac:graphicFrameMk id="4" creationId="{00000000-0000-0000-0000-000000000000}"/>
-          </ac:graphicFrameMkLst>
-        </pc:graphicFrameChg>
       </pc:sldChg>
     </pc:docChg>
   </pc:docChgLst>
@@ -364,6 +332,77 @@
           <pc:docMk/>
           <pc:sldMk cId="2050772099" sldId="669"/>
         </pc:sldMkLst>
+      </pc:sldChg>
+    </pc:docChg>
+  </pc:docChgLst>
+  <pc:docChgLst>
+    <pc:chgData name="Gerth Stølting Brodal" userId="04ef4784-6591-4f86-a140-f5c3b108582a" providerId="ADAL" clId="{27124F44-A0F7-408A-AA2B-2C5136C1DC06}"/>
+    <pc:docChg chg="modSld">
+      <pc:chgData name="Gerth Stølting Brodal" userId="04ef4784-6591-4f86-a140-f5c3b108582a" providerId="ADAL" clId="{27124F44-A0F7-408A-AA2B-2C5136C1DC06}" dt="2025-10-27T18:30:32.315" v="11" actId="962"/>
+      <pc:docMkLst>
+        <pc:docMk/>
+      </pc:docMkLst>
+      <pc:sldChg chg="modSp mod">
+        <pc:chgData name="Gerth Stølting Brodal" userId="04ef4784-6591-4f86-a140-f5c3b108582a" providerId="ADAL" clId="{27124F44-A0F7-408A-AA2B-2C5136C1DC06}" dt="2025-10-27T18:30:32.315" v="11" actId="962"/>
+        <pc:sldMkLst>
+          <pc:docMk/>
+          <pc:sldMk cId="825996582" sldId="667"/>
+        </pc:sldMkLst>
+        <pc:spChg chg="mod">
+          <ac:chgData name="Gerth Stølting Brodal" userId="04ef4784-6591-4f86-a140-f5c3b108582a" providerId="ADAL" clId="{27124F44-A0F7-408A-AA2B-2C5136C1DC06}" dt="2025-10-27T18:30:01.572" v="3" actId="962"/>
+          <ac:spMkLst>
+            <pc:docMk/>
+            <pc:sldMk cId="825996582" sldId="667"/>
+            <ac:spMk id="5" creationId="{00000000-0000-0000-0000-000000000000}"/>
+          </ac:spMkLst>
+        </pc:spChg>
+        <pc:spChg chg="mod">
+          <ac:chgData name="Gerth Stølting Brodal" userId="04ef4784-6591-4f86-a140-f5c3b108582a" providerId="ADAL" clId="{27124F44-A0F7-408A-AA2B-2C5136C1DC06}" dt="2025-10-27T18:30:32.315" v="11" actId="962"/>
+          <ac:spMkLst>
+            <pc:docMk/>
+            <pc:sldMk cId="825996582" sldId="667"/>
+            <ac:spMk id="11" creationId="{00000000-0000-0000-0000-000000000000}"/>
+          </ac:spMkLst>
+        </pc:spChg>
+        <pc:graphicFrameChg chg="mod">
+          <ac:chgData name="Gerth Stølting Brodal" userId="04ef4784-6591-4f86-a140-f5c3b108582a" providerId="ADAL" clId="{27124F44-A0F7-408A-AA2B-2C5136C1DC06}" dt="2025-10-27T18:30:23.145" v="5" actId="962"/>
+          <ac:graphicFrameMkLst>
+            <pc:docMk/>
+            <pc:sldMk cId="825996582" sldId="667"/>
+            <ac:graphicFrameMk id="6" creationId="{00000000-0000-0000-0000-000000000000}"/>
+          </ac:graphicFrameMkLst>
+        </pc:graphicFrameChg>
+        <pc:graphicFrameChg chg="mod">
+          <ac:chgData name="Gerth Stølting Brodal" userId="04ef4784-6591-4f86-a140-f5c3b108582a" providerId="ADAL" clId="{27124F44-A0F7-408A-AA2B-2C5136C1DC06}" dt="2025-10-27T18:30:25.521" v="7" actId="962"/>
+          <ac:graphicFrameMkLst>
+            <pc:docMk/>
+            <pc:sldMk cId="825996582" sldId="667"/>
+            <ac:graphicFrameMk id="7" creationId="{00000000-0000-0000-0000-000000000000}"/>
+          </ac:graphicFrameMkLst>
+        </pc:graphicFrameChg>
+        <pc:cxnChg chg="mod">
+          <ac:chgData name="Gerth Stølting Brodal" userId="04ef4784-6591-4f86-a140-f5c3b108582a" providerId="ADAL" clId="{27124F44-A0F7-408A-AA2B-2C5136C1DC06}" dt="2025-10-27T18:30:29.020" v="9" actId="962"/>
+          <ac:cxnSpMkLst>
+            <pc:docMk/>
+            <pc:sldMk cId="825996582" sldId="667"/>
+            <ac:cxnSpMk id="8" creationId="{00000000-0000-0000-0000-000000000000}"/>
+          </ac:cxnSpMkLst>
+        </pc:cxnChg>
+      </pc:sldChg>
+      <pc:sldChg chg="modSp mod">
+        <pc:chgData name="Gerth Stølting Brodal" userId="04ef4784-6591-4f86-a140-f5c3b108582a" providerId="ADAL" clId="{27124F44-A0F7-408A-AA2B-2C5136C1DC06}" dt="2025-10-27T18:29:53.135" v="1" actId="962"/>
+        <pc:sldMkLst>
+          <pc:docMk/>
+          <pc:sldMk cId="2697473546" sldId="674"/>
+        </pc:sldMkLst>
+        <pc:spChg chg="mod">
+          <ac:chgData name="Gerth Stølting Brodal" userId="04ef4784-6591-4f86-a140-f5c3b108582a" providerId="ADAL" clId="{27124F44-A0F7-408A-AA2B-2C5136C1DC06}" dt="2025-10-27T18:29:53.135" v="1" actId="962"/>
+          <ac:spMkLst>
+            <pc:docMk/>
+            <pc:sldMk cId="2697473546" sldId="674"/>
+            <ac:spMk id="5" creationId="{00000000-0000-0000-0000-000000000000}"/>
+          </ac:spMkLst>
+        </pc:spChg>
       </pc:sldChg>
     </pc:docChg>
   </pc:docChgLst>
@@ -496,7 +535,7 @@
           <a:p>
             <a:fld id="{FB1A172F-81D4-4DC4-9113-1DBD56EC3646}" type="datetimeFigureOut">
               <a:rPr lang="en-US" smtClean="0"/>
-              <a:t>3/5/2025</a:t>
+              <a:t>10/27/2025</a:t>
             </a:fld>
             <a:endParaRPr lang="en-US"/>
           </a:p>
@@ -2566,7 +2605,7 @@
           <a:p>
             <a:fld id="{0560A9CD-0304-4E0B-9E82-E7E0115DE05B}" type="datetimeFigureOut">
               <a:rPr lang="en-US" smtClean="0"/>
-              <a:t>3/5/2025</a:t>
+              <a:t>10/27/2025</a:t>
             </a:fld>
             <a:endParaRPr lang="en-US"/>
           </a:p>
@@ -2734,7 +2773,7 @@
           <a:p>
             <a:fld id="{0560A9CD-0304-4E0B-9E82-E7E0115DE05B}" type="datetimeFigureOut">
               <a:rPr lang="en-US" smtClean="0"/>
-              <a:t>3/5/2025</a:t>
+              <a:t>10/27/2025</a:t>
             </a:fld>
             <a:endParaRPr lang="en-US"/>
           </a:p>
@@ -2912,7 +2951,7 @@
           <a:p>
             <a:fld id="{0560A9CD-0304-4E0B-9E82-E7E0115DE05B}" type="datetimeFigureOut">
               <a:rPr lang="en-US" smtClean="0"/>
-              <a:t>3/5/2025</a:t>
+              <a:t>10/27/2025</a:t>
             </a:fld>
             <a:endParaRPr lang="en-US"/>
           </a:p>
@@ -3095,7 +3134,7 @@
           <a:p>
             <a:fld id="{0560A9CD-0304-4E0B-9E82-E7E0115DE05B}" type="datetimeFigureOut">
               <a:rPr lang="en-US" smtClean="0"/>
-              <a:t>3/5/2025</a:t>
+              <a:t>10/27/2025</a:t>
             </a:fld>
             <a:endParaRPr lang="en-US"/>
           </a:p>
@@ -3340,7 +3379,7 @@
           <a:p>
             <a:fld id="{0560A9CD-0304-4E0B-9E82-E7E0115DE05B}" type="datetimeFigureOut">
               <a:rPr lang="en-US" smtClean="0"/>
-              <a:t>3/5/2025</a:t>
+              <a:t>10/27/2025</a:t>
             </a:fld>
             <a:endParaRPr lang="en-US"/>
           </a:p>
@@ -3569,7 +3608,7 @@
           <a:p>
             <a:fld id="{0560A9CD-0304-4E0B-9E82-E7E0115DE05B}" type="datetimeFigureOut">
               <a:rPr lang="en-US" smtClean="0"/>
-              <a:t>3/5/2025</a:t>
+              <a:t>10/27/2025</a:t>
             </a:fld>
             <a:endParaRPr lang="en-US"/>
           </a:p>
@@ -3933,7 +3972,7 @@
           <a:p>
             <a:fld id="{0560A9CD-0304-4E0B-9E82-E7E0115DE05B}" type="datetimeFigureOut">
               <a:rPr lang="en-US" smtClean="0"/>
-              <a:t>3/5/2025</a:t>
+              <a:t>10/27/2025</a:t>
             </a:fld>
             <a:endParaRPr lang="en-US"/>
           </a:p>
@@ -4050,7 +4089,7 @@
           <a:p>
             <a:fld id="{0560A9CD-0304-4E0B-9E82-E7E0115DE05B}" type="datetimeFigureOut">
               <a:rPr lang="en-US" smtClean="0"/>
-              <a:t>3/5/2025</a:t>
+              <a:t>10/27/2025</a:t>
             </a:fld>
             <a:endParaRPr lang="en-US"/>
           </a:p>
@@ -4145,7 +4184,7 @@
           <a:p>
             <a:fld id="{0560A9CD-0304-4E0B-9E82-E7E0115DE05B}" type="datetimeFigureOut">
               <a:rPr lang="en-US" smtClean="0"/>
-              <a:t>3/5/2025</a:t>
+              <a:t>10/27/2025</a:t>
             </a:fld>
             <a:endParaRPr lang="en-US"/>
           </a:p>
@@ -4420,7 +4459,7 @@
           <a:p>
             <a:fld id="{0560A9CD-0304-4E0B-9E82-E7E0115DE05B}" type="datetimeFigureOut">
               <a:rPr lang="en-US" smtClean="0"/>
-              <a:t>3/5/2025</a:t>
+              <a:t>10/27/2025</a:t>
             </a:fld>
             <a:endParaRPr lang="en-US"/>
           </a:p>
@@ -4672,7 +4711,7 @@
           <a:p>
             <a:fld id="{0560A9CD-0304-4E0B-9E82-E7E0115DE05B}" type="datetimeFigureOut">
               <a:rPr lang="en-US" smtClean="0"/>
-              <a:t>3/5/2025</a:t>
+              <a:t>10/27/2025</a:t>
             </a:fld>
             <a:endParaRPr lang="en-US"/>
           </a:p>
@@ -4883,7 +4922,7 @@
           <a:p>
             <a:fld id="{0560A9CD-0304-4E0B-9E82-E7E0115DE05B}" type="datetimeFigureOut">
               <a:rPr lang="en-US" smtClean="0"/>
-              <a:t>3/5/2025</a:t>
+              <a:t>10/27/2025</a:t>
             </a:fld>
             <a:endParaRPr lang="en-US"/>
           </a:p>
@@ -6343,7 +6382,7 @@
       </p:sp>
       <p:sp>
         <p:nvSpPr>
-          <p:cNvPr id="5" name="Smiley Face 4"/>
+          <p:cNvPr id="5" name="Smiley Face 4" descr="QuizAnswer"/>
           <p:cNvSpPr/>
           <p:nvPr/>
         </p:nvSpPr>
@@ -22059,7 +22098,7 @@
       </p:graphicFrame>
       <p:sp>
         <p:nvSpPr>
-          <p:cNvPr id="5" name="Smiley Face 4"/>
+          <p:cNvPr id="5" name="Smiley Face 4" descr="QuizAnswer"/>
           <p:cNvSpPr/>
           <p:nvPr/>
         </p:nvSpPr>
@@ -22112,14 +22151,14 @@
       </p:sp>
       <p:graphicFrame>
         <p:nvGraphicFramePr>
-          <p:cNvPr id="6" name="Table 5"/>
+          <p:cNvPr id="6" name="Table 5" descr="QuizAnswer"/>
           <p:cNvGraphicFramePr>
             <a:graphicFrameLocks noGrp="1"/>
           </p:cNvGraphicFramePr>
           <p:nvPr>
             <p:extLst>
               <p:ext uri="{D42A27DB-BD31-4B8C-83A1-F6EECF244321}">
-                <p14:modId xmlns:p14="http://schemas.microsoft.com/office/powerpoint/2010/main" val="3625070827"/>
+                <p14:modId xmlns:p14="http://schemas.microsoft.com/office/powerpoint/2010/main" val="3907075706"/>
               </p:ext>
             </p:extLst>
           </p:nvPr>
@@ -22403,14 +22442,14 @@
       </p:graphicFrame>
       <p:graphicFrame>
         <p:nvGraphicFramePr>
-          <p:cNvPr id="7" name="Table 6"/>
+          <p:cNvPr id="7" name="Table 6" descr="QuizAnswer"/>
           <p:cNvGraphicFramePr>
             <a:graphicFrameLocks noGrp="1"/>
           </p:cNvGraphicFramePr>
           <p:nvPr>
             <p:extLst>
               <p:ext uri="{D42A27DB-BD31-4B8C-83A1-F6EECF244321}">
-                <p14:modId xmlns:p14="http://schemas.microsoft.com/office/powerpoint/2010/main" val="1026288411"/>
+                <p14:modId xmlns:p14="http://schemas.microsoft.com/office/powerpoint/2010/main" val="1620791683"/>
               </p:ext>
             </p:extLst>
           </p:nvPr>
@@ -22626,7 +22665,7 @@
       </p:graphicFrame>
       <p:cxnSp>
         <p:nvCxnSpPr>
-          <p:cNvPr id="8" name="Straight Arrow Connector 7"/>
+          <p:cNvPr id="8" name="Straight Arrow Connector 7" descr="QuizAnswer"/>
           <p:cNvCxnSpPr/>
           <p:nvPr/>
         </p:nvCxnSpPr>
@@ -22662,7 +22701,7 @@
       </p:cxnSp>
       <p:sp>
         <p:nvSpPr>
-          <p:cNvPr id="11" name="Rectangle 10"/>
+          <p:cNvPr id="11" name="Rectangle 10" descr="QuizAnswer"/>
           <p:cNvSpPr/>
           <p:nvPr/>
         </p:nvSpPr>

</xml_diff>